<commit_message>
finish animating the presentation
</commit_message>
<xml_diff>
--- a/presentation.pptx
+++ b/presentation.pptx
@@ -24999,6 +24999,345 @@
   <p:clrMapOvr>
     <a:masterClrMapping/>
   </p:clrMapOvr>
+  <p:timing>
+    <p:tnLst>
+      <p:par>
+        <p:cTn id="1" dur="indefinite" restart="never" nodeType="tmRoot">
+          <p:childTnLst>
+            <p:seq concurrent="1" nextAc="seek">
+              <p:cTn id="2" dur="indefinite" nodeType="mainSeq">
+                <p:childTnLst>
+                  <p:par>
+                    <p:cTn id="3" fill="hold">
+                      <p:stCondLst>
+                        <p:cond delay="indefinite"/>
+                      </p:stCondLst>
+                      <p:childTnLst>
+                        <p:par>
+                          <p:cTn id="4" fill="hold">
+                            <p:stCondLst>
+                              <p:cond delay="0"/>
+                            </p:stCondLst>
+                            <p:childTnLst>
+                              <p:par>
+                                <p:cTn id="5" presetID="10" presetClass="entr" presetSubtype="0" fill="hold" grpId="0" nodeType="clickEffect">
+                                  <p:stCondLst>
+                                    <p:cond delay="0"/>
+                                  </p:stCondLst>
+                                  <p:childTnLst>
+                                    <p:set>
+                                      <p:cBhvr>
+                                        <p:cTn id="6" dur="1" fill="hold">
+                                          <p:stCondLst>
+                                            <p:cond delay="0"/>
+                                          </p:stCondLst>
+                                        </p:cTn>
+                                        <p:tgtEl>
+                                          <p:spTgt spid="5">
+                                            <p:txEl>
+                                              <p:pRg st="0" end="0"/>
+                                            </p:txEl>
+                                          </p:spTgt>
+                                        </p:tgtEl>
+                                        <p:attrNameLst>
+                                          <p:attrName>style.visibility</p:attrName>
+                                        </p:attrNameLst>
+                                      </p:cBhvr>
+                                      <p:to>
+                                        <p:strVal val="visible"/>
+                                      </p:to>
+                                    </p:set>
+                                    <p:animEffect transition="in" filter="fade">
+                                      <p:cBhvr>
+                                        <p:cTn id="7" dur="500"/>
+                                        <p:tgtEl>
+                                          <p:spTgt spid="5">
+                                            <p:txEl>
+                                              <p:pRg st="0" end="0"/>
+                                            </p:txEl>
+                                          </p:spTgt>
+                                        </p:tgtEl>
+                                      </p:cBhvr>
+                                    </p:animEffect>
+                                  </p:childTnLst>
+                                </p:cTn>
+                              </p:par>
+                            </p:childTnLst>
+                          </p:cTn>
+                        </p:par>
+                      </p:childTnLst>
+                    </p:cTn>
+                  </p:par>
+                  <p:par>
+                    <p:cTn id="8" fill="hold">
+                      <p:stCondLst>
+                        <p:cond delay="indefinite"/>
+                      </p:stCondLst>
+                      <p:childTnLst>
+                        <p:par>
+                          <p:cTn id="9" fill="hold">
+                            <p:stCondLst>
+                              <p:cond delay="0"/>
+                            </p:stCondLst>
+                            <p:childTnLst>
+                              <p:par>
+                                <p:cTn id="10" presetID="10" presetClass="entr" presetSubtype="0" fill="hold" grpId="0" nodeType="clickEffect">
+                                  <p:stCondLst>
+                                    <p:cond delay="0"/>
+                                  </p:stCondLst>
+                                  <p:childTnLst>
+                                    <p:set>
+                                      <p:cBhvr>
+                                        <p:cTn id="11" dur="1" fill="hold">
+                                          <p:stCondLst>
+                                            <p:cond delay="0"/>
+                                          </p:stCondLst>
+                                        </p:cTn>
+                                        <p:tgtEl>
+                                          <p:spTgt spid="5">
+                                            <p:txEl>
+                                              <p:pRg st="1" end="1"/>
+                                            </p:txEl>
+                                          </p:spTgt>
+                                        </p:tgtEl>
+                                        <p:attrNameLst>
+                                          <p:attrName>style.visibility</p:attrName>
+                                        </p:attrNameLst>
+                                      </p:cBhvr>
+                                      <p:to>
+                                        <p:strVal val="visible"/>
+                                      </p:to>
+                                    </p:set>
+                                    <p:animEffect transition="in" filter="fade">
+                                      <p:cBhvr>
+                                        <p:cTn id="12" dur="500"/>
+                                        <p:tgtEl>
+                                          <p:spTgt spid="5">
+                                            <p:txEl>
+                                              <p:pRg st="1" end="1"/>
+                                            </p:txEl>
+                                          </p:spTgt>
+                                        </p:tgtEl>
+                                      </p:cBhvr>
+                                    </p:animEffect>
+                                  </p:childTnLst>
+                                </p:cTn>
+                              </p:par>
+                            </p:childTnLst>
+                          </p:cTn>
+                        </p:par>
+                      </p:childTnLst>
+                    </p:cTn>
+                  </p:par>
+                  <p:par>
+                    <p:cTn id="13" fill="hold">
+                      <p:stCondLst>
+                        <p:cond delay="indefinite"/>
+                      </p:stCondLst>
+                      <p:childTnLst>
+                        <p:par>
+                          <p:cTn id="14" fill="hold">
+                            <p:stCondLst>
+                              <p:cond delay="0"/>
+                            </p:stCondLst>
+                            <p:childTnLst>
+                              <p:par>
+                                <p:cTn id="15" presetID="10" presetClass="entr" presetSubtype="0" fill="hold" grpId="0" nodeType="clickEffect">
+                                  <p:stCondLst>
+                                    <p:cond delay="0"/>
+                                  </p:stCondLst>
+                                  <p:childTnLst>
+                                    <p:set>
+                                      <p:cBhvr>
+                                        <p:cTn id="16" dur="1" fill="hold">
+                                          <p:stCondLst>
+                                            <p:cond delay="0"/>
+                                          </p:stCondLst>
+                                        </p:cTn>
+                                        <p:tgtEl>
+                                          <p:spTgt spid="5">
+                                            <p:txEl>
+                                              <p:pRg st="2" end="2"/>
+                                            </p:txEl>
+                                          </p:spTgt>
+                                        </p:tgtEl>
+                                        <p:attrNameLst>
+                                          <p:attrName>style.visibility</p:attrName>
+                                        </p:attrNameLst>
+                                      </p:cBhvr>
+                                      <p:to>
+                                        <p:strVal val="visible"/>
+                                      </p:to>
+                                    </p:set>
+                                    <p:animEffect transition="in" filter="fade">
+                                      <p:cBhvr>
+                                        <p:cTn id="17" dur="500"/>
+                                        <p:tgtEl>
+                                          <p:spTgt spid="5">
+                                            <p:txEl>
+                                              <p:pRg st="2" end="2"/>
+                                            </p:txEl>
+                                          </p:spTgt>
+                                        </p:tgtEl>
+                                      </p:cBhvr>
+                                    </p:animEffect>
+                                  </p:childTnLst>
+                                </p:cTn>
+                              </p:par>
+                            </p:childTnLst>
+                          </p:cTn>
+                        </p:par>
+                      </p:childTnLst>
+                    </p:cTn>
+                  </p:par>
+                  <p:par>
+                    <p:cTn id="18" fill="hold">
+                      <p:stCondLst>
+                        <p:cond delay="indefinite"/>
+                      </p:stCondLst>
+                      <p:childTnLst>
+                        <p:par>
+                          <p:cTn id="19" fill="hold">
+                            <p:stCondLst>
+                              <p:cond delay="0"/>
+                            </p:stCondLst>
+                            <p:childTnLst>
+                              <p:par>
+                                <p:cTn id="20" presetID="10" presetClass="entr" presetSubtype="0" fill="hold" grpId="0" nodeType="clickEffect">
+                                  <p:stCondLst>
+                                    <p:cond delay="0"/>
+                                  </p:stCondLst>
+                                  <p:childTnLst>
+                                    <p:set>
+                                      <p:cBhvr>
+                                        <p:cTn id="21" dur="1" fill="hold">
+                                          <p:stCondLst>
+                                            <p:cond delay="0"/>
+                                          </p:stCondLst>
+                                        </p:cTn>
+                                        <p:tgtEl>
+                                          <p:spTgt spid="9">
+                                            <p:txEl>
+                                              <p:pRg st="0" end="0"/>
+                                            </p:txEl>
+                                          </p:spTgt>
+                                        </p:tgtEl>
+                                        <p:attrNameLst>
+                                          <p:attrName>style.visibility</p:attrName>
+                                        </p:attrNameLst>
+                                      </p:cBhvr>
+                                      <p:to>
+                                        <p:strVal val="visible"/>
+                                      </p:to>
+                                    </p:set>
+                                    <p:animEffect transition="in" filter="fade">
+                                      <p:cBhvr>
+                                        <p:cTn id="22" dur="500"/>
+                                        <p:tgtEl>
+                                          <p:spTgt spid="9">
+                                            <p:txEl>
+                                              <p:pRg st="0" end="0"/>
+                                            </p:txEl>
+                                          </p:spTgt>
+                                        </p:tgtEl>
+                                      </p:cBhvr>
+                                    </p:animEffect>
+                                  </p:childTnLst>
+                                </p:cTn>
+                              </p:par>
+                            </p:childTnLst>
+                          </p:cTn>
+                        </p:par>
+                      </p:childTnLst>
+                    </p:cTn>
+                  </p:par>
+                  <p:par>
+                    <p:cTn id="23" fill="hold">
+                      <p:stCondLst>
+                        <p:cond delay="indefinite"/>
+                      </p:stCondLst>
+                      <p:childTnLst>
+                        <p:par>
+                          <p:cTn id="24" fill="hold">
+                            <p:stCondLst>
+                              <p:cond delay="0"/>
+                            </p:stCondLst>
+                            <p:childTnLst>
+                              <p:par>
+                                <p:cTn id="25" presetID="10" presetClass="entr" presetSubtype="0" fill="hold" grpId="0" nodeType="clickEffect">
+                                  <p:stCondLst>
+                                    <p:cond delay="0"/>
+                                  </p:stCondLst>
+                                  <p:childTnLst>
+                                    <p:set>
+                                      <p:cBhvr>
+                                        <p:cTn id="26" dur="1" fill="hold">
+                                          <p:stCondLst>
+                                            <p:cond delay="0"/>
+                                          </p:stCondLst>
+                                        </p:cTn>
+                                        <p:tgtEl>
+                                          <p:spTgt spid="9">
+                                            <p:txEl>
+                                              <p:pRg st="1" end="1"/>
+                                            </p:txEl>
+                                          </p:spTgt>
+                                        </p:tgtEl>
+                                        <p:attrNameLst>
+                                          <p:attrName>style.visibility</p:attrName>
+                                        </p:attrNameLst>
+                                      </p:cBhvr>
+                                      <p:to>
+                                        <p:strVal val="visible"/>
+                                      </p:to>
+                                    </p:set>
+                                    <p:animEffect transition="in" filter="fade">
+                                      <p:cBhvr>
+                                        <p:cTn id="27" dur="500"/>
+                                        <p:tgtEl>
+                                          <p:spTgt spid="9">
+                                            <p:txEl>
+                                              <p:pRg st="1" end="1"/>
+                                            </p:txEl>
+                                          </p:spTgt>
+                                        </p:tgtEl>
+                                      </p:cBhvr>
+                                    </p:animEffect>
+                                  </p:childTnLst>
+                                </p:cTn>
+                              </p:par>
+                            </p:childTnLst>
+                          </p:cTn>
+                        </p:par>
+                      </p:childTnLst>
+                    </p:cTn>
+                  </p:par>
+                </p:childTnLst>
+              </p:cTn>
+              <p:prevCondLst>
+                <p:cond evt="onPrev" delay="0">
+                  <p:tgtEl>
+                    <p:sldTgt/>
+                  </p:tgtEl>
+                </p:cond>
+              </p:prevCondLst>
+              <p:nextCondLst>
+                <p:cond evt="onNext" delay="0">
+                  <p:tgtEl>
+                    <p:sldTgt/>
+                  </p:tgtEl>
+                </p:cond>
+              </p:nextCondLst>
+            </p:seq>
+          </p:childTnLst>
+        </p:cTn>
+      </p:par>
+    </p:tnLst>
+    <p:bldLst>
+      <p:bldP spid="5" grpId="0" build="p"/>
+      <p:bldP spid="9" grpId="0" build="p"/>
+    </p:bldLst>
+  </p:timing>
 </p:sld>
 </file>
 
@@ -25347,6 +25686,223 @@
   <p:clrMapOvr>
     <a:masterClrMapping/>
   </p:clrMapOvr>
+  <p:timing>
+    <p:tnLst>
+      <p:par>
+        <p:cTn id="1" dur="indefinite" restart="never" nodeType="tmRoot">
+          <p:childTnLst>
+            <p:seq concurrent="1" nextAc="seek">
+              <p:cTn id="2" dur="indefinite" nodeType="mainSeq">
+                <p:childTnLst>
+                  <p:par>
+                    <p:cTn id="3" fill="hold">
+                      <p:stCondLst>
+                        <p:cond delay="indefinite"/>
+                      </p:stCondLst>
+                      <p:childTnLst>
+                        <p:par>
+                          <p:cTn id="4" fill="hold">
+                            <p:stCondLst>
+                              <p:cond delay="0"/>
+                            </p:stCondLst>
+                            <p:childTnLst>
+                              <p:par>
+                                <p:cTn id="5" presetID="10" presetClass="entr" presetSubtype="0" fill="hold" grpId="0" nodeType="clickEffect">
+                                  <p:stCondLst>
+                                    <p:cond delay="0"/>
+                                  </p:stCondLst>
+                                  <p:childTnLst>
+                                    <p:set>
+                                      <p:cBhvr>
+                                        <p:cTn id="6" dur="1" fill="hold">
+                                          <p:stCondLst>
+                                            <p:cond delay="0"/>
+                                          </p:stCondLst>
+                                        </p:cTn>
+                                        <p:tgtEl>
+                                          <p:spTgt spid="5">
+                                            <p:txEl>
+                                              <p:pRg st="0" end="0"/>
+                                            </p:txEl>
+                                          </p:spTgt>
+                                        </p:tgtEl>
+                                        <p:attrNameLst>
+                                          <p:attrName>style.visibility</p:attrName>
+                                        </p:attrNameLst>
+                                      </p:cBhvr>
+                                      <p:to>
+                                        <p:strVal val="visible"/>
+                                      </p:to>
+                                    </p:set>
+                                    <p:animEffect transition="in" filter="fade">
+                                      <p:cBhvr>
+                                        <p:cTn id="7" dur="500"/>
+                                        <p:tgtEl>
+                                          <p:spTgt spid="5">
+                                            <p:txEl>
+                                              <p:pRg st="0" end="0"/>
+                                            </p:txEl>
+                                          </p:spTgt>
+                                        </p:tgtEl>
+                                      </p:cBhvr>
+                                    </p:animEffect>
+                                  </p:childTnLst>
+                                </p:cTn>
+                              </p:par>
+                            </p:childTnLst>
+                          </p:cTn>
+                        </p:par>
+                      </p:childTnLst>
+                    </p:cTn>
+                  </p:par>
+                  <p:par>
+                    <p:cTn id="8" fill="hold">
+                      <p:stCondLst>
+                        <p:cond delay="indefinite"/>
+                      </p:stCondLst>
+                      <p:childTnLst>
+                        <p:par>
+                          <p:cTn id="9" fill="hold">
+                            <p:stCondLst>
+                              <p:cond delay="0"/>
+                            </p:stCondLst>
+                            <p:childTnLst>
+                              <p:par>
+                                <p:cTn id="10" presetID="10" presetClass="entr" presetSubtype="0" fill="hold" grpId="0" nodeType="clickEffect">
+                                  <p:stCondLst>
+                                    <p:cond delay="0"/>
+                                  </p:stCondLst>
+                                  <p:childTnLst>
+                                    <p:set>
+                                      <p:cBhvr>
+                                        <p:cTn id="11" dur="1" fill="hold">
+                                          <p:stCondLst>
+                                            <p:cond delay="0"/>
+                                          </p:stCondLst>
+                                        </p:cTn>
+                                        <p:tgtEl>
+                                          <p:spTgt spid="5">
+                                            <p:txEl>
+                                              <p:pRg st="1" end="1"/>
+                                            </p:txEl>
+                                          </p:spTgt>
+                                        </p:tgtEl>
+                                        <p:attrNameLst>
+                                          <p:attrName>style.visibility</p:attrName>
+                                        </p:attrNameLst>
+                                      </p:cBhvr>
+                                      <p:to>
+                                        <p:strVal val="visible"/>
+                                      </p:to>
+                                    </p:set>
+                                    <p:animEffect transition="in" filter="fade">
+                                      <p:cBhvr>
+                                        <p:cTn id="12" dur="500"/>
+                                        <p:tgtEl>
+                                          <p:spTgt spid="5">
+                                            <p:txEl>
+                                              <p:pRg st="1" end="1"/>
+                                            </p:txEl>
+                                          </p:spTgt>
+                                        </p:tgtEl>
+                                      </p:cBhvr>
+                                    </p:animEffect>
+                                  </p:childTnLst>
+                                </p:cTn>
+                              </p:par>
+                            </p:childTnLst>
+                          </p:cTn>
+                        </p:par>
+                      </p:childTnLst>
+                    </p:cTn>
+                  </p:par>
+                  <p:par>
+                    <p:cTn id="13" fill="hold">
+                      <p:stCondLst>
+                        <p:cond delay="indefinite"/>
+                      </p:stCondLst>
+                      <p:childTnLst>
+                        <p:par>
+                          <p:cTn id="14" fill="hold">
+                            <p:stCondLst>
+                              <p:cond delay="0"/>
+                            </p:stCondLst>
+                            <p:childTnLst>
+                              <p:par>
+                                <p:cTn id="15" presetID="10" presetClass="entr" presetSubtype="0" fill="hold" grpId="0" nodeType="clickEffect">
+                                  <p:stCondLst>
+                                    <p:cond delay="0"/>
+                                  </p:stCondLst>
+                                  <p:childTnLst>
+                                    <p:set>
+                                      <p:cBhvr>
+                                        <p:cTn id="16" dur="1" fill="hold">
+                                          <p:stCondLst>
+                                            <p:cond delay="0"/>
+                                          </p:stCondLst>
+                                        </p:cTn>
+                                        <p:tgtEl>
+                                          <p:spTgt spid="9">
+                                            <p:txEl>
+                                              <p:pRg st="0" end="0"/>
+                                            </p:txEl>
+                                          </p:spTgt>
+                                        </p:tgtEl>
+                                        <p:attrNameLst>
+                                          <p:attrName>style.visibility</p:attrName>
+                                        </p:attrNameLst>
+                                      </p:cBhvr>
+                                      <p:to>
+                                        <p:strVal val="visible"/>
+                                      </p:to>
+                                    </p:set>
+                                    <p:animEffect transition="in" filter="fade">
+                                      <p:cBhvr>
+                                        <p:cTn id="17" dur="500"/>
+                                        <p:tgtEl>
+                                          <p:spTgt spid="9">
+                                            <p:txEl>
+                                              <p:pRg st="0" end="0"/>
+                                            </p:txEl>
+                                          </p:spTgt>
+                                        </p:tgtEl>
+                                      </p:cBhvr>
+                                    </p:animEffect>
+                                  </p:childTnLst>
+                                </p:cTn>
+                              </p:par>
+                            </p:childTnLst>
+                          </p:cTn>
+                        </p:par>
+                      </p:childTnLst>
+                    </p:cTn>
+                  </p:par>
+                </p:childTnLst>
+              </p:cTn>
+              <p:prevCondLst>
+                <p:cond evt="onPrev" delay="0">
+                  <p:tgtEl>
+                    <p:sldTgt/>
+                  </p:tgtEl>
+                </p:cond>
+              </p:prevCondLst>
+              <p:nextCondLst>
+                <p:cond evt="onNext" delay="0">
+                  <p:tgtEl>
+                    <p:sldTgt/>
+                  </p:tgtEl>
+                </p:cond>
+              </p:nextCondLst>
+            </p:seq>
+          </p:childTnLst>
+        </p:cTn>
+      </p:par>
+    </p:tnLst>
+    <p:bldLst>
+      <p:bldP spid="5" grpId="0" build="p"/>
+      <p:bldP spid="9" grpId="0" build="p"/>
+    </p:bldLst>
+  </p:timing>
 </p:sld>
 </file>
 
@@ -25527,6 +26083,223 @@
   <p:clrMapOvr>
     <a:masterClrMapping/>
   </p:clrMapOvr>
+  <p:timing>
+    <p:tnLst>
+      <p:par>
+        <p:cTn id="1" dur="indefinite" restart="never" nodeType="tmRoot">
+          <p:childTnLst>
+            <p:seq concurrent="1" nextAc="seek">
+              <p:cTn id="2" dur="indefinite" nodeType="mainSeq">
+                <p:childTnLst>
+                  <p:par>
+                    <p:cTn id="3" fill="hold">
+                      <p:stCondLst>
+                        <p:cond delay="indefinite"/>
+                      </p:stCondLst>
+                      <p:childTnLst>
+                        <p:par>
+                          <p:cTn id="4" fill="hold">
+                            <p:stCondLst>
+                              <p:cond delay="0"/>
+                            </p:stCondLst>
+                            <p:childTnLst>
+                              <p:par>
+                                <p:cTn id="5" presetID="10" presetClass="entr" presetSubtype="0" fill="hold" grpId="0" nodeType="clickEffect">
+                                  <p:stCondLst>
+                                    <p:cond delay="0"/>
+                                  </p:stCondLst>
+                                  <p:childTnLst>
+                                    <p:set>
+                                      <p:cBhvr>
+                                        <p:cTn id="6" dur="1" fill="hold">
+                                          <p:stCondLst>
+                                            <p:cond delay="0"/>
+                                          </p:stCondLst>
+                                        </p:cTn>
+                                        <p:tgtEl>
+                                          <p:spTgt spid="5">
+                                            <p:txEl>
+                                              <p:pRg st="0" end="0"/>
+                                            </p:txEl>
+                                          </p:spTgt>
+                                        </p:tgtEl>
+                                        <p:attrNameLst>
+                                          <p:attrName>style.visibility</p:attrName>
+                                        </p:attrNameLst>
+                                      </p:cBhvr>
+                                      <p:to>
+                                        <p:strVal val="visible"/>
+                                      </p:to>
+                                    </p:set>
+                                    <p:animEffect transition="in" filter="fade">
+                                      <p:cBhvr>
+                                        <p:cTn id="7" dur="500"/>
+                                        <p:tgtEl>
+                                          <p:spTgt spid="5">
+                                            <p:txEl>
+                                              <p:pRg st="0" end="0"/>
+                                            </p:txEl>
+                                          </p:spTgt>
+                                        </p:tgtEl>
+                                      </p:cBhvr>
+                                    </p:animEffect>
+                                  </p:childTnLst>
+                                </p:cTn>
+                              </p:par>
+                            </p:childTnLst>
+                          </p:cTn>
+                        </p:par>
+                      </p:childTnLst>
+                    </p:cTn>
+                  </p:par>
+                  <p:par>
+                    <p:cTn id="8" fill="hold">
+                      <p:stCondLst>
+                        <p:cond delay="indefinite"/>
+                      </p:stCondLst>
+                      <p:childTnLst>
+                        <p:par>
+                          <p:cTn id="9" fill="hold">
+                            <p:stCondLst>
+                              <p:cond delay="0"/>
+                            </p:stCondLst>
+                            <p:childTnLst>
+                              <p:par>
+                                <p:cTn id="10" presetID="10" presetClass="entr" presetSubtype="0" fill="hold" grpId="0" nodeType="clickEffect">
+                                  <p:stCondLst>
+                                    <p:cond delay="0"/>
+                                  </p:stCondLst>
+                                  <p:childTnLst>
+                                    <p:set>
+                                      <p:cBhvr>
+                                        <p:cTn id="11" dur="1" fill="hold">
+                                          <p:stCondLst>
+                                            <p:cond delay="0"/>
+                                          </p:stCondLst>
+                                        </p:cTn>
+                                        <p:tgtEl>
+                                          <p:spTgt spid="9">
+                                            <p:txEl>
+                                              <p:pRg st="0" end="0"/>
+                                            </p:txEl>
+                                          </p:spTgt>
+                                        </p:tgtEl>
+                                        <p:attrNameLst>
+                                          <p:attrName>style.visibility</p:attrName>
+                                        </p:attrNameLst>
+                                      </p:cBhvr>
+                                      <p:to>
+                                        <p:strVal val="visible"/>
+                                      </p:to>
+                                    </p:set>
+                                    <p:animEffect transition="in" filter="fade">
+                                      <p:cBhvr>
+                                        <p:cTn id="12" dur="500"/>
+                                        <p:tgtEl>
+                                          <p:spTgt spid="9">
+                                            <p:txEl>
+                                              <p:pRg st="0" end="0"/>
+                                            </p:txEl>
+                                          </p:spTgt>
+                                        </p:tgtEl>
+                                      </p:cBhvr>
+                                    </p:animEffect>
+                                  </p:childTnLst>
+                                </p:cTn>
+                              </p:par>
+                            </p:childTnLst>
+                          </p:cTn>
+                        </p:par>
+                      </p:childTnLst>
+                    </p:cTn>
+                  </p:par>
+                  <p:par>
+                    <p:cTn id="13" fill="hold">
+                      <p:stCondLst>
+                        <p:cond delay="indefinite"/>
+                      </p:stCondLst>
+                      <p:childTnLst>
+                        <p:par>
+                          <p:cTn id="14" fill="hold">
+                            <p:stCondLst>
+                              <p:cond delay="0"/>
+                            </p:stCondLst>
+                            <p:childTnLst>
+                              <p:par>
+                                <p:cTn id="15" presetID="10" presetClass="entr" presetSubtype="0" fill="hold" grpId="0" nodeType="clickEffect">
+                                  <p:stCondLst>
+                                    <p:cond delay="0"/>
+                                  </p:stCondLst>
+                                  <p:childTnLst>
+                                    <p:set>
+                                      <p:cBhvr>
+                                        <p:cTn id="16" dur="1" fill="hold">
+                                          <p:stCondLst>
+                                            <p:cond delay="0"/>
+                                          </p:stCondLst>
+                                        </p:cTn>
+                                        <p:tgtEl>
+                                          <p:spTgt spid="9">
+                                            <p:txEl>
+                                              <p:pRg st="1" end="1"/>
+                                            </p:txEl>
+                                          </p:spTgt>
+                                        </p:tgtEl>
+                                        <p:attrNameLst>
+                                          <p:attrName>style.visibility</p:attrName>
+                                        </p:attrNameLst>
+                                      </p:cBhvr>
+                                      <p:to>
+                                        <p:strVal val="visible"/>
+                                      </p:to>
+                                    </p:set>
+                                    <p:animEffect transition="in" filter="fade">
+                                      <p:cBhvr>
+                                        <p:cTn id="17" dur="500"/>
+                                        <p:tgtEl>
+                                          <p:spTgt spid="9">
+                                            <p:txEl>
+                                              <p:pRg st="1" end="1"/>
+                                            </p:txEl>
+                                          </p:spTgt>
+                                        </p:tgtEl>
+                                      </p:cBhvr>
+                                    </p:animEffect>
+                                  </p:childTnLst>
+                                </p:cTn>
+                              </p:par>
+                            </p:childTnLst>
+                          </p:cTn>
+                        </p:par>
+                      </p:childTnLst>
+                    </p:cTn>
+                  </p:par>
+                </p:childTnLst>
+              </p:cTn>
+              <p:prevCondLst>
+                <p:cond evt="onPrev" delay="0">
+                  <p:tgtEl>
+                    <p:sldTgt/>
+                  </p:tgtEl>
+                </p:cond>
+              </p:prevCondLst>
+              <p:nextCondLst>
+                <p:cond evt="onNext" delay="0">
+                  <p:tgtEl>
+                    <p:sldTgt/>
+                  </p:tgtEl>
+                </p:cond>
+              </p:nextCondLst>
+            </p:seq>
+          </p:childTnLst>
+        </p:cTn>
+      </p:par>
+    </p:tnLst>
+    <p:bldLst>
+      <p:bldP spid="5" grpId="0" build="p"/>
+      <p:bldP spid="9" grpId="0" build="p"/>
+    </p:bldLst>
+  </p:timing>
 </p:sld>
 </file>
 
@@ -25703,6 +26476,223 @@
   <p:clrMapOvr>
     <a:masterClrMapping/>
   </p:clrMapOvr>
+  <p:timing>
+    <p:tnLst>
+      <p:par>
+        <p:cTn id="1" dur="indefinite" restart="never" nodeType="tmRoot">
+          <p:childTnLst>
+            <p:seq concurrent="1" nextAc="seek">
+              <p:cTn id="2" dur="indefinite" nodeType="mainSeq">
+                <p:childTnLst>
+                  <p:par>
+                    <p:cTn id="3" fill="hold">
+                      <p:stCondLst>
+                        <p:cond delay="indefinite"/>
+                      </p:stCondLst>
+                      <p:childTnLst>
+                        <p:par>
+                          <p:cTn id="4" fill="hold">
+                            <p:stCondLst>
+                              <p:cond delay="0"/>
+                            </p:stCondLst>
+                            <p:childTnLst>
+                              <p:par>
+                                <p:cTn id="5" presetID="10" presetClass="entr" presetSubtype="0" fill="hold" grpId="0" nodeType="clickEffect">
+                                  <p:stCondLst>
+                                    <p:cond delay="0"/>
+                                  </p:stCondLst>
+                                  <p:childTnLst>
+                                    <p:set>
+                                      <p:cBhvr>
+                                        <p:cTn id="6" dur="1" fill="hold">
+                                          <p:stCondLst>
+                                            <p:cond delay="0"/>
+                                          </p:stCondLst>
+                                        </p:cTn>
+                                        <p:tgtEl>
+                                          <p:spTgt spid="5">
+                                            <p:txEl>
+                                              <p:pRg st="0" end="0"/>
+                                            </p:txEl>
+                                          </p:spTgt>
+                                        </p:tgtEl>
+                                        <p:attrNameLst>
+                                          <p:attrName>style.visibility</p:attrName>
+                                        </p:attrNameLst>
+                                      </p:cBhvr>
+                                      <p:to>
+                                        <p:strVal val="visible"/>
+                                      </p:to>
+                                    </p:set>
+                                    <p:animEffect transition="in" filter="fade">
+                                      <p:cBhvr>
+                                        <p:cTn id="7" dur="500"/>
+                                        <p:tgtEl>
+                                          <p:spTgt spid="5">
+                                            <p:txEl>
+                                              <p:pRg st="0" end="0"/>
+                                            </p:txEl>
+                                          </p:spTgt>
+                                        </p:tgtEl>
+                                      </p:cBhvr>
+                                    </p:animEffect>
+                                  </p:childTnLst>
+                                </p:cTn>
+                              </p:par>
+                            </p:childTnLst>
+                          </p:cTn>
+                        </p:par>
+                      </p:childTnLst>
+                    </p:cTn>
+                  </p:par>
+                  <p:par>
+                    <p:cTn id="8" fill="hold">
+                      <p:stCondLst>
+                        <p:cond delay="indefinite"/>
+                      </p:stCondLst>
+                      <p:childTnLst>
+                        <p:par>
+                          <p:cTn id="9" fill="hold">
+                            <p:stCondLst>
+                              <p:cond delay="0"/>
+                            </p:stCondLst>
+                            <p:childTnLst>
+                              <p:par>
+                                <p:cTn id="10" presetID="10" presetClass="entr" presetSubtype="0" fill="hold" grpId="0" nodeType="clickEffect">
+                                  <p:stCondLst>
+                                    <p:cond delay="0"/>
+                                  </p:stCondLst>
+                                  <p:childTnLst>
+                                    <p:set>
+                                      <p:cBhvr>
+                                        <p:cTn id="11" dur="1" fill="hold">
+                                          <p:stCondLst>
+                                            <p:cond delay="0"/>
+                                          </p:stCondLst>
+                                        </p:cTn>
+                                        <p:tgtEl>
+                                          <p:spTgt spid="9">
+                                            <p:txEl>
+                                              <p:pRg st="0" end="0"/>
+                                            </p:txEl>
+                                          </p:spTgt>
+                                        </p:tgtEl>
+                                        <p:attrNameLst>
+                                          <p:attrName>style.visibility</p:attrName>
+                                        </p:attrNameLst>
+                                      </p:cBhvr>
+                                      <p:to>
+                                        <p:strVal val="visible"/>
+                                      </p:to>
+                                    </p:set>
+                                    <p:animEffect transition="in" filter="fade">
+                                      <p:cBhvr>
+                                        <p:cTn id="12" dur="500"/>
+                                        <p:tgtEl>
+                                          <p:spTgt spid="9">
+                                            <p:txEl>
+                                              <p:pRg st="0" end="0"/>
+                                            </p:txEl>
+                                          </p:spTgt>
+                                        </p:tgtEl>
+                                      </p:cBhvr>
+                                    </p:animEffect>
+                                  </p:childTnLst>
+                                </p:cTn>
+                              </p:par>
+                            </p:childTnLst>
+                          </p:cTn>
+                        </p:par>
+                      </p:childTnLst>
+                    </p:cTn>
+                  </p:par>
+                  <p:par>
+                    <p:cTn id="13" fill="hold">
+                      <p:stCondLst>
+                        <p:cond delay="indefinite"/>
+                      </p:stCondLst>
+                      <p:childTnLst>
+                        <p:par>
+                          <p:cTn id="14" fill="hold">
+                            <p:stCondLst>
+                              <p:cond delay="0"/>
+                            </p:stCondLst>
+                            <p:childTnLst>
+                              <p:par>
+                                <p:cTn id="15" presetID="10" presetClass="entr" presetSubtype="0" fill="hold" grpId="0" nodeType="clickEffect">
+                                  <p:stCondLst>
+                                    <p:cond delay="0"/>
+                                  </p:stCondLst>
+                                  <p:childTnLst>
+                                    <p:set>
+                                      <p:cBhvr>
+                                        <p:cTn id="16" dur="1" fill="hold">
+                                          <p:stCondLst>
+                                            <p:cond delay="0"/>
+                                          </p:stCondLst>
+                                        </p:cTn>
+                                        <p:tgtEl>
+                                          <p:spTgt spid="9">
+                                            <p:txEl>
+                                              <p:pRg st="1" end="1"/>
+                                            </p:txEl>
+                                          </p:spTgt>
+                                        </p:tgtEl>
+                                        <p:attrNameLst>
+                                          <p:attrName>style.visibility</p:attrName>
+                                        </p:attrNameLst>
+                                      </p:cBhvr>
+                                      <p:to>
+                                        <p:strVal val="visible"/>
+                                      </p:to>
+                                    </p:set>
+                                    <p:animEffect transition="in" filter="fade">
+                                      <p:cBhvr>
+                                        <p:cTn id="17" dur="500"/>
+                                        <p:tgtEl>
+                                          <p:spTgt spid="9">
+                                            <p:txEl>
+                                              <p:pRg st="1" end="1"/>
+                                            </p:txEl>
+                                          </p:spTgt>
+                                        </p:tgtEl>
+                                      </p:cBhvr>
+                                    </p:animEffect>
+                                  </p:childTnLst>
+                                </p:cTn>
+                              </p:par>
+                            </p:childTnLst>
+                          </p:cTn>
+                        </p:par>
+                      </p:childTnLst>
+                    </p:cTn>
+                  </p:par>
+                </p:childTnLst>
+              </p:cTn>
+              <p:prevCondLst>
+                <p:cond evt="onPrev" delay="0">
+                  <p:tgtEl>
+                    <p:sldTgt/>
+                  </p:tgtEl>
+                </p:cond>
+              </p:prevCondLst>
+              <p:nextCondLst>
+                <p:cond evt="onNext" delay="0">
+                  <p:tgtEl>
+                    <p:sldTgt/>
+                  </p:tgtEl>
+                </p:cond>
+              </p:nextCondLst>
+            </p:seq>
+          </p:childTnLst>
+        </p:cTn>
+      </p:par>
+    </p:tnLst>
+    <p:bldLst>
+      <p:bldP spid="5" grpId="0" build="p"/>
+      <p:bldP spid="9" grpId="0" build="p"/>
+    </p:bldLst>
+  </p:timing>
 </p:sld>
 </file>
 
@@ -25879,6 +26869,223 @@
   <p:clrMapOvr>
     <a:masterClrMapping/>
   </p:clrMapOvr>
+  <p:timing>
+    <p:tnLst>
+      <p:par>
+        <p:cTn id="1" dur="indefinite" restart="never" nodeType="tmRoot">
+          <p:childTnLst>
+            <p:seq concurrent="1" nextAc="seek">
+              <p:cTn id="2" dur="indefinite" nodeType="mainSeq">
+                <p:childTnLst>
+                  <p:par>
+                    <p:cTn id="3" fill="hold">
+                      <p:stCondLst>
+                        <p:cond delay="indefinite"/>
+                      </p:stCondLst>
+                      <p:childTnLst>
+                        <p:par>
+                          <p:cTn id="4" fill="hold">
+                            <p:stCondLst>
+                              <p:cond delay="0"/>
+                            </p:stCondLst>
+                            <p:childTnLst>
+                              <p:par>
+                                <p:cTn id="5" presetID="10" presetClass="entr" presetSubtype="0" fill="hold" grpId="0" nodeType="clickEffect">
+                                  <p:stCondLst>
+                                    <p:cond delay="0"/>
+                                  </p:stCondLst>
+                                  <p:childTnLst>
+                                    <p:set>
+                                      <p:cBhvr>
+                                        <p:cTn id="6" dur="1" fill="hold">
+                                          <p:stCondLst>
+                                            <p:cond delay="0"/>
+                                          </p:stCondLst>
+                                        </p:cTn>
+                                        <p:tgtEl>
+                                          <p:spTgt spid="5">
+                                            <p:txEl>
+                                              <p:pRg st="0" end="0"/>
+                                            </p:txEl>
+                                          </p:spTgt>
+                                        </p:tgtEl>
+                                        <p:attrNameLst>
+                                          <p:attrName>style.visibility</p:attrName>
+                                        </p:attrNameLst>
+                                      </p:cBhvr>
+                                      <p:to>
+                                        <p:strVal val="visible"/>
+                                      </p:to>
+                                    </p:set>
+                                    <p:animEffect transition="in" filter="fade">
+                                      <p:cBhvr>
+                                        <p:cTn id="7" dur="500"/>
+                                        <p:tgtEl>
+                                          <p:spTgt spid="5">
+                                            <p:txEl>
+                                              <p:pRg st="0" end="0"/>
+                                            </p:txEl>
+                                          </p:spTgt>
+                                        </p:tgtEl>
+                                      </p:cBhvr>
+                                    </p:animEffect>
+                                  </p:childTnLst>
+                                </p:cTn>
+                              </p:par>
+                            </p:childTnLst>
+                          </p:cTn>
+                        </p:par>
+                      </p:childTnLst>
+                    </p:cTn>
+                  </p:par>
+                  <p:par>
+                    <p:cTn id="8" fill="hold">
+                      <p:stCondLst>
+                        <p:cond delay="indefinite"/>
+                      </p:stCondLst>
+                      <p:childTnLst>
+                        <p:par>
+                          <p:cTn id="9" fill="hold">
+                            <p:stCondLst>
+                              <p:cond delay="0"/>
+                            </p:stCondLst>
+                            <p:childTnLst>
+                              <p:par>
+                                <p:cTn id="10" presetID="10" presetClass="entr" presetSubtype="0" fill="hold" grpId="0" nodeType="clickEffect">
+                                  <p:stCondLst>
+                                    <p:cond delay="0"/>
+                                  </p:stCondLst>
+                                  <p:childTnLst>
+                                    <p:set>
+                                      <p:cBhvr>
+                                        <p:cTn id="11" dur="1" fill="hold">
+                                          <p:stCondLst>
+                                            <p:cond delay="0"/>
+                                          </p:stCondLst>
+                                        </p:cTn>
+                                        <p:tgtEl>
+                                          <p:spTgt spid="9">
+                                            <p:txEl>
+                                              <p:pRg st="0" end="0"/>
+                                            </p:txEl>
+                                          </p:spTgt>
+                                        </p:tgtEl>
+                                        <p:attrNameLst>
+                                          <p:attrName>style.visibility</p:attrName>
+                                        </p:attrNameLst>
+                                      </p:cBhvr>
+                                      <p:to>
+                                        <p:strVal val="visible"/>
+                                      </p:to>
+                                    </p:set>
+                                    <p:animEffect transition="in" filter="fade">
+                                      <p:cBhvr>
+                                        <p:cTn id="12" dur="500"/>
+                                        <p:tgtEl>
+                                          <p:spTgt spid="9">
+                                            <p:txEl>
+                                              <p:pRg st="0" end="0"/>
+                                            </p:txEl>
+                                          </p:spTgt>
+                                        </p:tgtEl>
+                                      </p:cBhvr>
+                                    </p:animEffect>
+                                  </p:childTnLst>
+                                </p:cTn>
+                              </p:par>
+                            </p:childTnLst>
+                          </p:cTn>
+                        </p:par>
+                      </p:childTnLst>
+                    </p:cTn>
+                  </p:par>
+                  <p:par>
+                    <p:cTn id="13" fill="hold">
+                      <p:stCondLst>
+                        <p:cond delay="indefinite"/>
+                      </p:stCondLst>
+                      <p:childTnLst>
+                        <p:par>
+                          <p:cTn id="14" fill="hold">
+                            <p:stCondLst>
+                              <p:cond delay="0"/>
+                            </p:stCondLst>
+                            <p:childTnLst>
+                              <p:par>
+                                <p:cTn id="15" presetID="10" presetClass="entr" presetSubtype="0" fill="hold" grpId="0" nodeType="clickEffect">
+                                  <p:stCondLst>
+                                    <p:cond delay="0"/>
+                                  </p:stCondLst>
+                                  <p:childTnLst>
+                                    <p:set>
+                                      <p:cBhvr>
+                                        <p:cTn id="16" dur="1" fill="hold">
+                                          <p:stCondLst>
+                                            <p:cond delay="0"/>
+                                          </p:stCondLst>
+                                        </p:cTn>
+                                        <p:tgtEl>
+                                          <p:spTgt spid="9">
+                                            <p:txEl>
+                                              <p:pRg st="1" end="1"/>
+                                            </p:txEl>
+                                          </p:spTgt>
+                                        </p:tgtEl>
+                                        <p:attrNameLst>
+                                          <p:attrName>style.visibility</p:attrName>
+                                        </p:attrNameLst>
+                                      </p:cBhvr>
+                                      <p:to>
+                                        <p:strVal val="visible"/>
+                                      </p:to>
+                                    </p:set>
+                                    <p:animEffect transition="in" filter="fade">
+                                      <p:cBhvr>
+                                        <p:cTn id="17" dur="500"/>
+                                        <p:tgtEl>
+                                          <p:spTgt spid="9">
+                                            <p:txEl>
+                                              <p:pRg st="1" end="1"/>
+                                            </p:txEl>
+                                          </p:spTgt>
+                                        </p:tgtEl>
+                                      </p:cBhvr>
+                                    </p:animEffect>
+                                  </p:childTnLst>
+                                </p:cTn>
+                              </p:par>
+                            </p:childTnLst>
+                          </p:cTn>
+                        </p:par>
+                      </p:childTnLst>
+                    </p:cTn>
+                  </p:par>
+                </p:childTnLst>
+              </p:cTn>
+              <p:prevCondLst>
+                <p:cond evt="onPrev" delay="0">
+                  <p:tgtEl>
+                    <p:sldTgt/>
+                  </p:tgtEl>
+                </p:cond>
+              </p:prevCondLst>
+              <p:nextCondLst>
+                <p:cond evt="onNext" delay="0">
+                  <p:tgtEl>
+                    <p:sldTgt/>
+                  </p:tgtEl>
+                </p:cond>
+              </p:nextCondLst>
+            </p:seq>
+          </p:childTnLst>
+        </p:cTn>
+      </p:par>
+    </p:tnLst>
+    <p:bldLst>
+      <p:bldP spid="5" grpId="0" build="p"/>
+      <p:bldP spid="9" grpId="0" build="p"/>
+    </p:bldLst>
+  </p:timing>
 </p:sld>
 </file>
 
@@ -26141,6 +27348,223 @@
   <p:clrMapOvr>
     <a:masterClrMapping/>
   </p:clrMapOvr>
+  <p:timing>
+    <p:tnLst>
+      <p:par>
+        <p:cTn id="1" dur="indefinite" restart="never" nodeType="tmRoot">
+          <p:childTnLst>
+            <p:seq concurrent="1" nextAc="seek">
+              <p:cTn id="2" dur="indefinite" nodeType="mainSeq">
+                <p:childTnLst>
+                  <p:par>
+                    <p:cTn id="3" fill="hold">
+                      <p:stCondLst>
+                        <p:cond delay="indefinite"/>
+                      </p:stCondLst>
+                      <p:childTnLst>
+                        <p:par>
+                          <p:cTn id="4" fill="hold">
+                            <p:stCondLst>
+                              <p:cond delay="0"/>
+                            </p:stCondLst>
+                            <p:childTnLst>
+                              <p:par>
+                                <p:cTn id="5" presetID="10" presetClass="entr" presetSubtype="0" fill="hold" grpId="0" nodeType="clickEffect">
+                                  <p:stCondLst>
+                                    <p:cond delay="0"/>
+                                  </p:stCondLst>
+                                  <p:childTnLst>
+                                    <p:set>
+                                      <p:cBhvr>
+                                        <p:cTn id="6" dur="1" fill="hold">
+                                          <p:stCondLst>
+                                            <p:cond delay="0"/>
+                                          </p:stCondLst>
+                                        </p:cTn>
+                                        <p:tgtEl>
+                                          <p:spTgt spid="5">
+                                            <p:txEl>
+                                              <p:pRg st="0" end="0"/>
+                                            </p:txEl>
+                                          </p:spTgt>
+                                        </p:tgtEl>
+                                        <p:attrNameLst>
+                                          <p:attrName>style.visibility</p:attrName>
+                                        </p:attrNameLst>
+                                      </p:cBhvr>
+                                      <p:to>
+                                        <p:strVal val="visible"/>
+                                      </p:to>
+                                    </p:set>
+                                    <p:animEffect transition="in" filter="fade">
+                                      <p:cBhvr>
+                                        <p:cTn id="7" dur="500"/>
+                                        <p:tgtEl>
+                                          <p:spTgt spid="5">
+                                            <p:txEl>
+                                              <p:pRg st="0" end="0"/>
+                                            </p:txEl>
+                                          </p:spTgt>
+                                        </p:tgtEl>
+                                      </p:cBhvr>
+                                    </p:animEffect>
+                                  </p:childTnLst>
+                                </p:cTn>
+                              </p:par>
+                            </p:childTnLst>
+                          </p:cTn>
+                        </p:par>
+                      </p:childTnLst>
+                    </p:cTn>
+                  </p:par>
+                  <p:par>
+                    <p:cTn id="8" fill="hold">
+                      <p:stCondLst>
+                        <p:cond delay="indefinite"/>
+                      </p:stCondLst>
+                      <p:childTnLst>
+                        <p:par>
+                          <p:cTn id="9" fill="hold">
+                            <p:stCondLst>
+                              <p:cond delay="0"/>
+                            </p:stCondLst>
+                            <p:childTnLst>
+                              <p:par>
+                                <p:cTn id="10" presetID="10" presetClass="entr" presetSubtype="0" fill="hold" grpId="0" nodeType="clickEffect">
+                                  <p:stCondLst>
+                                    <p:cond delay="0"/>
+                                  </p:stCondLst>
+                                  <p:childTnLst>
+                                    <p:set>
+                                      <p:cBhvr>
+                                        <p:cTn id="11" dur="1" fill="hold">
+                                          <p:stCondLst>
+                                            <p:cond delay="0"/>
+                                          </p:stCondLst>
+                                        </p:cTn>
+                                        <p:tgtEl>
+                                          <p:spTgt spid="9">
+                                            <p:txEl>
+                                              <p:pRg st="0" end="0"/>
+                                            </p:txEl>
+                                          </p:spTgt>
+                                        </p:tgtEl>
+                                        <p:attrNameLst>
+                                          <p:attrName>style.visibility</p:attrName>
+                                        </p:attrNameLst>
+                                      </p:cBhvr>
+                                      <p:to>
+                                        <p:strVal val="visible"/>
+                                      </p:to>
+                                    </p:set>
+                                    <p:animEffect transition="in" filter="fade">
+                                      <p:cBhvr>
+                                        <p:cTn id="12" dur="500"/>
+                                        <p:tgtEl>
+                                          <p:spTgt spid="9">
+                                            <p:txEl>
+                                              <p:pRg st="0" end="0"/>
+                                            </p:txEl>
+                                          </p:spTgt>
+                                        </p:tgtEl>
+                                      </p:cBhvr>
+                                    </p:animEffect>
+                                  </p:childTnLst>
+                                </p:cTn>
+                              </p:par>
+                            </p:childTnLst>
+                          </p:cTn>
+                        </p:par>
+                      </p:childTnLst>
+                    </p:cTn>
+                  </p:par>
+                  <p:par>
+                    <p:cTn id="13" fill="hold">
+                      <p:stCondLst>
+                        <p:cond delay="indefinite"/>
+                      </p:stCondLst>
+                      <p:childTnLst>
+                        <p:par>
+                          <p:cTn id="14" fill="hold">
+                            <p:stCondLst>
+                              <p:cond delay="0"/>
+                            </p:stCondLst>
+                            <p:childTnLst>
+                              <p:par>
+                                <p:cTn id="15" presetID="10" presetClass="entr" presetSubtype="0" fill="hold" grpId="0" nodeType="clickEffect">
+                                  <p:stCondLst>
+                                    <p:cond delay="0"/>
+                                  </p:stCondLst>
+                                  <p:childTnLst>
+                                    <p:set>
+                                      <p:cBhvr>
+                                        <p:cTn id="16" dur="1" fill="hold">
+                                          <p:stCondLst>
+                                            <p:cond delay="0"/>
+                                          </p:stCondLst>
+                                        </p:cTn>
+                                        <p:tgtEl>
+                                          <p:spTgt spid="9">
+                                            <p:txEl>
+                                              <p:pRg st="1" end="1"/>
+                                            </p:txEl>
+                                          </p:spTgt>
+                                        </p:tgtEl>
+                                        <p:attrNameLst>
+                                          <p:attrName>style.visibility</p:attrName>
+                                        </p:attrNameLst>
+                                      </p:cBhvr>
+                                      <p:to>
+                                        <p:strVal val="visible"/>
+                                      </p:to>
+                                    </p:set>
+                                    <p:animEffect transition="in" filter="fade">
+                                      <p:cBhvr>
+                                        <p:cTn id="17" dur="500"/>
+                                        <p:tgtEl>
+                                          <p:spTgt spid="9">
+                                            <p:txEl>
+                                              <p:pRg st="1" end="1"/>
+                                            </p:txEl>
+                                          </p:spTgt>
+                                        </p:tgtEl>
+                                      </p:cBhvr>
+                                    </p:animEffect>
+                                  </p:childTnLst>
+                                </p:cTn>
+                              </p:par>
+                            </p:childTnLst>
+                          </p:cTn>
+                        </p:par>
+                      </p:childTnLst>
+                    </p:cTn>
+                  </p:par>
+                </p:childTnLst>
+              </p:cTn>
+              <p:prevCondLst>
+                <p:cond evt="onPrev" delay="0">
+                  <p:tgtEl>
+                    <p:sldTgt/>
+                  </p:tgtEl>
+                </p:cond>
+              </p:prevCondLst>
+              <p:nextCondLst>
+                <p:cond evt="onNext" delay="0">
+                  <p:tgtEl>
+                    <p:sldTgt/>
+                  </p:tgtEl>
+                </p:cond>
+              </p:nextCondLst>
+            </p:seq>
+          </p:childTnLst>
+        </p:cTn>
+      </p:par>
+    </p:tnLst>
+    <p:bldLst>
+      <p:bldP spid="5" grpId="0" build="p"/>
+      <p:bldP spid="9" grpId="0" build="p"/>
+    </p:bldLst>
+  </p:timing>
 </p:sld>
 </file>
 
@@ -26317,6 +27741,223 @@
   <p:clrMapOvr>
     <a:masterClrMapping/>
   </p:clrMapOvr>
+  <p:timing>
+    <p:tnLst>
+      <p:par>
+        <p:cTn id="1" dur="indefinite" restart="never" nodeType="tmRoot">
+          <p:childTnLst>
+            <p:seq concurrent="1" nextAc="seek">
+              <p:cTn id="2" dur="indefinite" nodeType="mainSeq">
+                <p:childTnLst>
+                  <p:par>
+                    <p:cTn id="3" fill="hold">
+                      <p:stCondLst>
+                        <p:cond delay="indefinite"/>
+                      </p:stCondLst>
+                      <p:childTnLst>
+                        <p:par>
+                          <p:cTn id="4" fill="hold">
+                            <p:stCondLst>
+                              <p:cond delay="0"/>
+                            </p:stCondLst>
+                            <p:childTnLst>
+                              <p:par>
+                                <p:cTn id="5" presetID="10" presetClass="entr" presetSubtype="0" fill="hold" grpId="0" nodeType="clickEffect">
+                                  <p:stCondLst>
+                                    <p:cond delay="0"/>
+                                  </p:stCondLst>
+                                  <p:childTnLst>
+                                    <p:set>
+                                      <p:cBhvr>
+                                        <p:cTn id="6" dur="1" fill="hold">
+                                          <p:stCondLst>
+                                            <p:cond delay="0"/>
+                                          </p:stCondLst>
+                                        </p:cTn>
+                                        <p:tgtEl>
+                                          <p:spTgt spid="5">
+                                            <p:txEl>
+                                              <p:pRg st="0" end="0"/>
+                                            </p:txEl>
+                                          </p:spTgt>
+                                        </p:tgtEl>
+                                        <p:attrNameLst>
+                                          <p:attrName>style.visibility</p:attrName>
+                                        </p:attrNameLst>
+                                      </p:cBhvr>
+                                      <p:to>
+                                        <p:strVal val="visible"/>
+                                      </p:to>
+                                    </p:set>
+                                    <p:animEffect transition="in" filter="fade">
+                                      <p:cBhvr>
+                                        <p:cTn id="7" dur="500"/>
+                                        <p:tgtEl>
+                                          <p:spTgt spid="5">
+                                            <p:txEl>
+                                              <p:pRg st="0" end="0"/>
+                                            </p:txEl>
+                                          </p:spTgt>
+                                        </p:tgtEl>
+                                      </p:cBhvr>
+                                    </p:animEffect>
+                                  </p:childTnLst>
+                                </p:cTn>
+                              </p:par>
+                            </p:childTnLst>
+                          </p:cTn>
+                        </p:par>
+                      </p:childTnLst>
+                    </p:cTn>
+                  </p:par>
+                  <p:par>
+                    <p:cTn id="8" fill="hold">
+                      <p:stCondLst>
+                        <p:cond delay="indefinite"/>
+                      </p:stCondLst>
+                      <p:childTnLst>
+                        <p:par>
+                          <p:cTn id="9" fill="hold">
+                            <p:stCondLst>
+                              <p:cond delay="0"/>
+                            </p:stCondLst>
+                            <p:childTnLst>
+                              <p:par>
+                                <p:cTn id="10" presetID="10" presetClass="entr" presetSubtype="0" fill="hold" grpId="0" nodeType="clickEffect">
+                                  <p:stCondLst>
+                                    <p:cond delay="0"/>
+                                  </p:stCondLst>
+                                  <p:childTnLst>
+                                    <p:set>
+                                      <p:cBhvr>
+                                        <p:cTn id="11" dur="1" fill="hold">
+                                          <p:stCondLst>
+                                            <p:cond delay="0"/>
+                                          </p:stCondLst>
+                                        </p:cTn>
+                                        <p:tgtEl>
+                                          <p:spTgt spid="9">
+                                            <p:txEl>
+                                              <p:pRg st="0" end="0"/>
+                                            </p:txEl>
+                                          </p:spTgt>
+                                        </p:tgtEl>
+                                        <p:attrNameLst>
+                                          <p:attrName>style.visibility</p:attrName>
+                                        </p:attrNameLst>
+                                      </p:cBhvr>
+                                      <p:to>
+                                        <p:strVal val="visible"/>
+                                      </p:to>
+                                    </p:set>
+                                    <p:animEffect transition="in" filter="fade">
+                                      <p:cBhvr>
+                                        <p:cTn id="12" dur="500"/>
+                                        <p:tgtEl>
+                                          <p:spTgt spid="9">
+                                            <p:txEl>
+                                              <p:pRg st="0" end="0"/>
+                                            </p:txEl>
+                                          </p:spTgt>
+                                        </p:tgtEl>
+                                      </p:cBhvr>
+                                    </p:animEffect>
+                                  </p:childTnLst>
+                                </p:cTn>
+                              </p:par>
+                            </p:childTnLst>
+                          </p:cTn>
+                        </p:par>
+                      </p:childTnLst>
+                    </p:cTn>
+                  </p:par>
+                  <p:par>
+                    <p:cTn id="13" fill="hold">
+                      <p:stCondLst>
+                        <p:cond delay="indefinite"/>
+                      </p:stCondLst>
+                      <p:childTnLst>
+                        <p:par>
+                          <p:cTn id="14" fill="hold">
+                            <p:stCondLst>
+                              <p:cond delay="0"/>
+                            </p:stCondLst>
+                            <p:childTnLst>
+                              <p:par>
+                                <p:cTn id="15" presetID="10" presetClass="entr" presetSubtype="0" fill="hold" grpId="0" nodeType="clickEffect">
+                                  <p:stCondLst>
+                                    <p:cond delay="0"/>
+                                  </p:stCondLst>
+                                  <p:childTnLst>
+                                    <p:set>
+                                      <p:cBhvr>
+                                        <p:cTn id="16" dur="1" fill="hold">
+                                          <p:stCondLst>
+                                            <p:cond delay="0"/>
+                                          </p:stCondLst>
+                                        </p:cTn>
+                                        <p:tgtEl>
+                                          <p:spTgt spid="9">
+                                            <p:txEl>
+                                              <p:pRg st="1" end="1"/>
+                                            </p:txEl>
+                                          </p:spTgt>
+                                        </p:tgtEl>
+                                        <p:attrNameLst>
+                                          <p:attrName>style.visibility</p:attrName>
+                                        </p:attrNameLst>
+                                      </p:cBhvr>
+                                      <p:to>
+                                        <p:strVal val="visible"/>
+                                      </p:to>
+                                    </p:set>
+                                    <p:animEffect transition="in" filter="fade">
+                                      <p:cBhvr>
+                                        <p:cTn id="17" dur="500"/>
+                                        <p:tgtEl>
+                                          <p:spTgt spid="9">
+                                            <p:txEl>
+                                              <p:pRg st="1" end="1"/>
+                                            </p:txEl>
+                                          </p:spTgt>
+                                        </p:tgtEl>
+                                      </p:cBhvr>
+                                    </p:animEffect>
+                                  </p:childTnLst>
+                                </p:cTn>
+                              </p:par>
+                            </p:childTnLst>
+                          </p:cTn>
+                        </p:par>
+                      </p:childTnLst>
+                    </p:cTn>
+                  </p:par>
+                </p:childTnLst>
+              </p:cTn>
+              <p:prevCondLst>
+                <p:cond evt="onPrev" delay="0">
+                  <p:tgtEl>
+                    <p:sldTgt/>
+                  </p:tgtEl>
+                </p:cond>
+              </p:prevCondLst>
+              <p:nextCondLst>
+                <p:cond evt="onNext" delay="0">
+                  <p:tgtEl>
+                    <p:sldTgt/>
+                  </p:tgtEl>
+                </p:cond>
+              </p:nextCondLst>
+            </p:seq>
+          </p:childTnLst>
+        </p:cTn>
+      </p:par>
+    </p:tnLst>
+    <p:bldLst>
+      <p:bldP spid="5" grpId="0" build="p"/>
+      <p:bldP spid="9" grpId="0" build="p"/>
+    </p:bldLst>
+  </p:timing>
 </p:sld>
 </file>
 
@@ -26493,6 +28134,223 @@
   <p:clrMapOvr>
     <a:masterClrMapping/>
   </p:clrMapOvr>
+  <p:timing>
+    <p:tnLst>
+      <p:par>
+        <p:cTn id="1" dur="indefinite" restart="never" nodeType="tmRoot">
+          <p:childTnLst>
+            <p:seq concurrent="1" nextAc="seek">
+              <p:cTn id="2" dur="indefinite" nodeType="mainSeq">
+                <p:childTnLst>
+                  <p:par>
+                    <p:cTn id="3" fill="hold">
+                      <p:stCondLst>
+                        <p:cond delay="indefinite"/>
+                      </p:stCondLst>
+                      <p:childTnLst>
+                        <p:par>
+                          <p:cTn id="4" fill="hold">
+                            <p:stCondLst>
+                              <p:cond delay="0"/>
+                            </p:stCondLst>
+                            <p:childTnLst>
+                              <p:par>
+                                <p:cTn id="5" presetID="10" presetClass="entr" presetSubtype="0" fill="hold" grpId="0" nodeType="clickEffect">
+                                  <p:stCondLst>
+                                    <p:cond delay="0"/>
+                                  </p:stCondLst>
+                                  <p:childTnLst>
+                                    <p:set>
+                                      <p:cBhvr>
+                                        <p:cTn id="6" dur="1" fill="hold">
+                                          <p:stCondLst>
+                                            <p:cond delay="0"/>
+                                          </p:stCondLst>
+                                        </p:cTn>
+                                        <p:tgtEl>
+                                          <p:spTgt spid="5">
+                                            <p:txEl>
+                                              <p:pRg st="0" end="0"/>
+                                            </p:txEl>
+                                          </p:spTgt>
+                                        </p:tgtEl>
+                                        <p:attrNameLst>
+                                          <p:attrName>style.visibility</p:attrName>
+                                        </p:attrNameLst>
+                                      </p:cBhvr>
+                                      <p:to>
+                                        <p:strVal val="visible"/>
+                                      </p:to>
+                                    </p:set>
+                                    <p:animEffect transition="in" filter="fade">
+                                      <p:cBhvr>
+                                        <p:cTn id="7" dur="500"/>
+                                        <p:tgtEl>
+                                          <p:spTgt spid="5">
+                                            <p:txEl>
+                                              <p:pRg st="0" end="0"/>
+                                            </p:txEl>
+                                          </p:spTgt>
+                                        </p:tgtEl>
+                                      </p:cBhvr>
+                                    </p:animEffect>
+                                  </p:childTnLst>
+                                </p:cTn>
+                              </p:par>
+                            </p:childTnLst>
+                          </p:cTn>
+                        </p:par>
+                      </p:childTnLst>
+                    </p:cTn>
+                  </p:par>
+                  <p:par>
+                    <p:cTn id="8" fill="hold">
+                      <p:stCondLst>
+                        <p:cond delay="indefinite"/>
+                      </p:stCondLst>
+                      <p:childTnLst>
+                        <p:par>
+                          <p:cTn id="9" fill="hold">
+                            <p:stCondLst>
+                              <p:cond delay="0"/>
+                            </p:stCondLst>
+                            <p:childTnLst>
+                              <p:par>
+                                <p:cTn id="10" presetID="10" presetClass="entr" presetSubtype="0" fill="hold" grpId="0" nodeType="clickEffect">
+                                  <p:stCondLst>
+                                    <p:cond delay="0"/>
+                                  </p:stCondLst>
+                                  <p:childTnLst>
+                                    <p:set>
+                                      <p:cBhvr>
+                                        <p:cTn id="11" dur="1" fill="hold">
+                                          <p:stCondLst>
+                                            <p:cond delay="0"/>
+                                          </p:stCondLst>
+                                        </p:cTn>
+                                        <p:tgtEl>
+                                          <p:spTgt spid="9">
+                                            <p:txEl>
+                                              <p:pRg st="0" end="0"/>
+                                            </p:txEl>
+                                          </p:spTgt>
+                                        </p:tgtEl>
+                                        <p:attrNameLst>
+                                          <p:attrName>style.visibility</p:attrName>
+                                        </p:attrNameLst>
+                                      </p:cBhvr>
+                                      <p:to>
+                                        <p:strVal val="visible"/>
+                                      </p:to>
+                                    </p:set>
+                                    <p:animEffect transition="in" filter="fade">
+                                      <p:cBhvr>
+                                        <p:cTn id="12" dur="500"/>
+                                        <p:tgtEl>
+                                          <p:spTgt spid="9">
+                                            <p:txEl>
+                                              <p:pRg st="0" end="0"/>
+                                            </p:txEl>
+                                          </p:spTgt>
+                                        </p:tgtEl>
+                                      </p:cBhvr>
+                                    </p:animEffect>
+                                  </p:childTnLst>
+                                </p:cTn>
+                              </p:par>
+                            </p:childTnLst>
+                          </p:cTn>
+                        </p:par>
+                      </p:childTnLst>
+                    </p:cTn>
+                  </p:par>
+                  <p:par>
+                    <p:cTn id="13" fill="hold">
+                      <p:stCondLst>
+                        <p:cond delay="indefinite"/>
+                      </p:stCondLst>
+                      <p:childTnLst>
+                        <p:par>
+                          <p:cTn id="14" fill="hold">
+                            <p:stCondLst>
+                              <p:cond delay="0"/>
+                            </p:stCondLst>
+                            <p:childTnLst>
+                              <p:par>
+                                <p:cTn id="15" presetID="10" presetClass="entr" presetSubtype="0" fill="hold" grpId="0" nodeType="clickEffect">
+                                  <p:stCondLst>
+                                    <p:cond delay="0"/>
+                                  </p:stCondLst>
+                                  <p:childTnLst>
+                                    <p:set>
+                                      <p:cBhvr>
+                                        <p:cTn id="16" dur="1" fill="hold">
+                                          <p:stCondLst>
+                                            <p:cond delay="0"/>
+                                          </p:stCondLst>
+                                        </p:cTn>
+                                        <p:tgtEl>
+                                          <p:spTgt spid="9">
+                                            <p:txEl>
+                                              <p:pRg st="1" end="1"/>
+                                            </p:txEl>
+                                          </p:spTgt>
+                                        </p:tgtEl>
+                                        <p:attrNameLst>
+                                          <p:attrName>style.visibility</p:attrName>
+                                        </p:attrNameLst>
+                                      </p:cBhvr>
+                                      <p:to>
+                                        <p:strVal val="visible"/>
+                                      </p:to>
+                                    </p:set>
+                                    <p:animEffect transition="in" filter="fade">
+                                      <p:cBhvr>
+                                        <p:cTn id="17" dur="500"/>
+                                        <p:tgtEl>
+                                          <p:spTgt spid="9">
+                                            <p:txEl>
+                                              <p:pRg st="1" end="1"/>
+                                            </p:txEl>
+                                          </p:spTgt>
+                                        </p:tgtEl>
+                                      </p:cBhvr>
+                                    </p:animEffect>
+                                  </p:childTnLst>
+                                </p:cTn>
+                              </p:par>
+                            </p:childTnLst>
+                          </p:cTn>
+                        </p:par>
+                      </p:childTnLst>
+                    </p:cTn>
+                  </p:par>
+                </p:childTnLst>
+              </p:cTn>
+              <p:prevCondLst>
+                <p:cond evt="onPrev" delay="0">
+                  <p:tgtEl>
+                    <p:sldTgt/>
+                  </p:tgtEl>
+                </p:cond>
+              </p:prevCondLst>
+              <p:nextCondLst>
+                <p:cond evt="onNext" delay="0">
+                  <p:tgtEl>
+                    <p:sldTgt/>
+                  </p:tgtEl>
+                </p:cond>
+              </p:nextCondLst>
+            </p:seq>
+          </p:childTnLst>
+        </p:cTn>
+      </p:par>
+    </p:tnLst>
+    <p:bldLst>
+      <p:bldP spid="5" grpId="0" build="p"/>
+      <p:bldP spid="9" grpId="0" build="p"/>
+    </p:bldLst>
+  </p:timing>
 </p:sld>
 </file>
 
@@ -26669,6 +28527,223 @@
   <p:clrMapOvr>
     <a:masterClrMapping/>
   </p:clrMapOvr>
+  <p:timing>
+    <p:tnLst>
+      <p:par>
+        <p:cTn id="1" dur="indefinite" restart="never" nodeType="tmRoot">
+          <p:childTnLst>
+            <p:seq concurrent="1" nextAc="seek">
+              <p:cTn id="2" dur="indefinite" nodeType="mainSeq">
+                <p:childTnLst>
+                  <p:par>
+                    <p:cTn id="3" fill="hold">
+                      <p:stCondLst>
+                        <p:cond delay="indefinite"/>
+                      </p:stCondLst>
+                      <p:childTnLst>
+                        <p:par>
+                          <p:cTn id="4" fill="hold">
+                            <p:stCondLst>
+                              <p:cond delay="0"/>
+                            </p:stCondLst>
+                            <p:childTnLst>
+                              <p:par>
+                                <p:cTn id="5" presetID="10" presetClass="entr" presetSubtype="0" fill="hold" grpId="0" nodeType="clickEffect">
+                                  <p:stCondLst>
+                                    <p:cond delay="0"/>
+                                  </p:stCondLst>
+                                  <p:childTnLst>
+                                    <p:set>
+                                      <p:cBhvr>
+                                        <p:cTn id="6" dur="1" fill="hold">
+                                          <p:stCondLst>
+                                            <p:cond delay="0"/>
+                                          </p:stCondLst>
+                                        </p:cTn>
+                                        <p:tgtEl>
+                                          <p:spTgt spid="5">
+                                            <p:txEl>
+                                              <p:pRg st="0" end="0"/>
+                                            </p:txEl>
+                                          </p:spTgt>
+                                        </p:tgtEl>
+                                        <p:attrNameLst>
+                                          <p:attrName>style.visibility</p:attrName>
+                                        </p:attrNameLst>
+                                      </p:cBhvr>
+                                      <p:to>
+                                        <p:strVal val="visible"/>
+                                      </p:to>
+                                    </p:set>
+                                    <p:animEffect transition="in" filter="fade">
+                                      <p:cBhvr>
+                                        <p:cTn id="7" dur="500"/>
+                                        <p:tgtEl>
+                                          <p:spTgt spid="5">
+                                            <p:txEl>
+                                              <p:pRg st="0" end="0"/>
+                                            </p:txEl>
+                                          </p:spTgt>
+                                        </p:tgtEl>
+                                      </p:cBhvr>
+                                    </p:animEffect>
+                                  </p:childTnLst>
+                                </p:cTn>
+                              </p:par>
+                            </p:childTnLst>
+                          </p:cTn>
+                        </p:par>
+                      </p:childTnLst>
+                    </p:cTn>
+                  </p:par>
+                  <p:par>
+                    <p:cTn id="8" fill="hold">
+                      <p:stCondLst>
+                        <p:cond delay="indefinite"/>
+                      </p:stCondLst>
+                      <p:childTnLst>
+                        <p:par>
+                          <p:cTn id="9" fill="hold">
+                            <p:stCondLst>
+                              <p:cond delay="0"/>
+                            </p:stCondLst>
+                            <p:childTnLst>
+                              <p:par>
+                                <p:cTn id="10" presetID="10" presetClass="entr" presetSubtype="0" fill="hold" grpId="0" nodeType="clickEffect">
+                                  <p:stCondLst>
+                                    <p:cond delay="0"/>
+                                  </p:stCondLst>
+                                  <p:childTnLst>
+                                    <p:set>
+                                      <p:cBhvr>
+                                        <p:cTn id="11" dur="1" fill="hold">
+                                          <p:stCondLst>
+                                            <p:cond delay="0"/>
+                                          </p:stCondLst>
+                                        </p:cTn>
+                                        <p:tgtEl>
+                                          <p:spTgt spid="5">
+                                            <p:txEl>
+                                              <p:pRg st="1" end="1"/>
+                                            </p:txEl>
+                                          </p:spTgt>
+                                        </p:tgtEl>
+                                        <p:attrNameLst>
+                                          <p:attrName>style.visibility</p:attrName>
+                                        </p:attrNameLst>
+                                      </p:cBhvr>
+                                      <p:to>
+                                        <p:strVal val="visible"/>
+                                      </p:to>
+                                    </p:set>
+                                    <p:animEffect transition="in" filter="fade">
+                                      <p:cBhvr>
+                                        <p:cTn id="12" dur="500"/>
+                                        <p:tgtEl>
+                                          <p:spTgt spid="5">
+                                            <p:txEl>
+                                              <p:pRg st="1" end="1"/>
+                                            </p:txEl>
+                                          </p:spTgt>
+                                        </p:tgtEl>
+                                      </p:cBhvr>
+                                    </p:animEffect>
+                                  </p:childTnLst>
+                                </p:cTn>
+                              </p:par>
+                            </p:childTnLst>
+                          </p:cTn>
+                        </p:par>
+                      </p:childTnLst>
+                    </p:cTn>
+                  </p:par>
+                  <p:par>
+                    <p:cTn id="13" fill="hold">
+                      <p:stCondLst>
+                        <p:cond delay="indefinite"/>
+                      </p:stCondLst>
+                      <p:childTnLst>
+                        <p:par>
+                          <p:cTn id="14" fill="hold">
+                            <p:stCondLst>
+                              <p:cond delay="0"/>
+                            </p:stCondLst>
+                            <p:childTnLst>
+                              <p:par>
+                                <p:cTn id="15" presetID="10" presetClass="entr" presetSubtype="0" fill="hold" grpId="0" nodeType="clickEffect">
+                                  <p:stCondLst>
+                                    <p:cond delay="0"/>
+                                  </p:stCondLst>
+                                  <p:childTnLst>
+                                    <p:set>
+                                      <p:cBhvr>
+                                        <p:cTn id="16" dur="1" fill="hold">
+                                          <p:stCondLst>
+                                            <p:cond delay="0"/>
+                                          </p:stCondLst>
+                                        </p:cTn>
+                                        <p:tgtEl>
+                                          <p:spTgt spid="9">
+                                            <p:txEl>
+                                              <p:pRg st="0" end="0"/>
+                                            </p:txEl>
+                                          </p:spTgt>
+                                        </p:tgtEl>
+                                        <p:attrNameLst>
+                                          <p:attrName>style.visibility</p:attrName>
+                                        </p:attrNameLst>
+                                      </p:cBhvr>
+                                      <p:to>
+                                        <p:strVal val="visible"/>
+                                      </p:to>
+                                    </p:set>
+                                    <p:animEffect transition="in" filter="fade">
+                                      <p:cBhvr>
+                                        <p:cTn id="17" dur="500"/>
+                                        <p:tgtEl>
+                                          <p:spTgt spid="9">
+                                            <p:txEl>
+                                              <p:pRg st="0" end="0"/>
+                                            </p:txEl>
+                                          </p:spTgt>
+                                        </p:tgtEl>
+                                      </p:cBhvr>
+                                    </p:animEffect>
+                                  </p:childTnLst>
+                                </p:cTn>
+                              </p:par>
+                            </p:childTnLst>
+                          </p:cTn>
+                        </p:par>
+                      </p:childTnLst>
+                    </p:cTn>
+                  </p:par>
+                </p:childTnLst>
+              </p:cTn>
+              <p:prevCondLst>
+                <p:cond evt="onPrev" delay="0">
+                  <p:tgtEl>
+                    <p:sldTgt/>
+                  </p:tgtEl>
+                </p:cond>
+              </p:prevCondLst>
+              <p:nextCondLst>
+                <p:cond evt="onNext" delay="0">
+                  <p:tgtEl>
+                    <p:sldTgt/>
+                  </p:tgtEl>
+                </p:cond>
+              </p:nextCondLst>
+            </p:seq>
+          </p:childTnLst>
+        </p:cTn>
+      </p:par>
+    </p:tnLst>
+    <p:bldLst>
+      <p:bldP spid="5" grpId="0" build="p"/>
+      <p:bldP spid="9" grpId="0" build="p"/>
+    </p:bldLst>
+  </p:timing>
 </p:sld>
 </file>
 
@@ -27316,6 +29391,223 @@
   <p:clrMapOvr>
     <a:masterClrMapping/>
   </p:clrMapOvr>
+  <p:timing>
+    <p:tnLst>
+      <p:par>
+        <p:cTn id="1" dur="indefinite" restart="never" nodeType="tmRoot">
+          <p:childTnLst>
+            <p:seq concurrent="1" nextAc="seek">
+              <p:cTn id="2" dur="indefinite" nodeType="mainSeq">
+                <p:childTnLst>
+                  <p:par>
+                    <p:cTn id="3" fill="hold">
+                      <p:stCondLst>
+                        <p:cond delay="indefinite"/>
+                      </p:stCondLst>
+                      <p:childTnLst>
+                        <p:par>
+                          <p:cTn id="4" fill="hold">
+                            <p:stCondLst>
+                              <p:cond delay="0"/>
+                            </p:stCondLst>
+                            <p:childTnLst>
+                              <p:par>
+                                <p:cTn id="5" presetID="10" presetClass="entr" presetSubtype="0" fill="hold" grpId="0" nodeType="clickEffect">
+                                  <p:stCondLst>
+                                    <p:cond delay="0"/>
+                                  </p:stCondLst>
+                                  <p:childTnLst>
+                                    <p:set>
+                                      <p:cBhvr>
+                                        <p:cTn id="6" dur="1" fill="hold">
+                                          <p:stCondLst>
+                                            <p:cond delay="0"/>
+                                          </p:stCondLst>
+                                        </p:cTn>
+                                        <p:tgtEl>
+                                          <p:spTgt spid="5">
+                                            <p:txEl>
+                                              <p:pRg st="0" end="0"/>
+                                            </p:txEl>
+                                          </p:spTgt>
+                                        </p:tgtEl>
+                                        <p:attrNameLst>
+                                          <p:attrName>style.visibility</p:attrName>
+                                        </p:attrNameLst>
+                                      </p:cBhvr>
+                                      <p:to>
+                                        <p:strVal val="visible"/>
+                                      </p:to>
+                                    </p:set>
+                                    <p:animEffect transition="in" filter="fade">
+                                      <p:cBhvr>
+                                        <p:cTn id="7" dur="500"/>
+                                        <p:tgtEl>
+                                          <p:spTgt spid="5">
+                                            <p:txEl>
+                                              <p:pRg st="0" end="0"/>
+                                            </p:txEl>
+                                          </p:spTgt>
+                                        </p:tgtEl>
+                                      </p:cBhvr>
+                                    </p:animEffect>
+                                  </p:childTnLst>
+                                </p:cTn>
+                              </p:par>
+                            </p:childTnLst>
+                          </p:cTn>
+                        </p:par>
+                      </p:childTnLst>
+                    </p:cTn>
+                  </p:par>
+                  <p:par>
+                    <p:cTn id="8" fill="hold">
+                      <p:stCondLst>
+                        <p:cond delay="indefinite"/>
+                      </p:stCondLst>
+                      <p:childTnLst>
+                        <p:par>
+                          <p:cTn id="9" fill="hold">
+                            <p:stCondLst>
+                              <p:cond delay="0"/>
+                            </p:stCondLst>
+                            <p:childTnLst>
+                              <p:par>
+                                <p:cTn id="10" presetID="10" presetClass="entr" presetSubtype="0" fill="hold" grpId="0" nodeType="clickEffect">
+                                  <p:stCondLst>
+                                    <p:cond delay="0"/>
+                                  </p:stCondLst>
+                                  <p:childTnLst>
+                                    <p:set>
+                                      <p:cBhvr>
+                                        <p:cTn id="11" dur="1" fill="hold">
+                                          <p:stCondLst>
+                                            <p:cond delay="0"/>
+                                          </p:stCondLst>
+                                        </p:cTn>
+                                        <p:tgtEl>
+                                          <p:spTgt spid="9">
+                                            <p:txEl>
+                                              <p:pRg st="0" end="0"/>
+                                            </p:txEl>
+                                          </p:spTgt>
+                                        </p:tgtEl>
+                                        <p:attrNameLst>
+                                          <p:attrName>style.visibility</p:attrName>
+                                        </p:attrNameLst>
+                                      </p:cBhvr>
+                                      <p:to>
+                                        <p:strVal val="visible"/>
+                                      </p:to>
+                                    </p:set>
+                                    <p:animEffect transition="in" filter="fade">
+                                      <p:cBhvr>
+                                        <p:cTn id="12" dur="500"/>
+                                        <p:tgtEl>
+                                          <p:spTgt spid="9">
+                                            <p:txEl>
+                                              <p:pRg st="0" end="0"/>
+                                            </p:txEl>
+                                          </p:spTgt>
+                                        </p:tgtEl>
+                                      </p:cBhvr>
+                                    </p:animEffect>
+                                  </p:childTnLst>
+                                </p:cTn>
+                              </p:par>
+                            </p:childTnLst>
+                          </p:cTn>
+                        </p:par>
+                      </p:childTnLst>
+                    </p:cTn>
+                  </p:par>
+                  <p:par>
+                    <p:cTn id="13" fill="hold">
+                      <p:stCondLst>
+                        <p:cond delay="indefinite"/>
+                      </p:stCondLst>
+                      <p:childTnLst>
+                        <p:par>
+                          <p:cTn id="14" fill="hold">
+                            <p:stCondLst>
+                              <p:cond delay="0"/>
+                            </p:stCondLst>
+                            <p:childTnLst>
+                              <p:par>
+                                <p:cTn id="15" presetID="10" presetClass="entr" presetSubtype="0" fill="hold" grpId="0" nodeType="clickEffect">
+                                  <p:stCondLst>
+                                    <p:cond delay="0"/>
+                                  </p:stCondLst>
+                                  <p:childTnLst>
+                                    <p:set>
+                                      <p:cBhvr>
+                                        <p:cTn id="16" dur="1" fill="hold">
+                                          <p:stCondLst>
+                                            <p:cond delay="0"/>
+                                          </p:stCondLst>
+                                        </p:cTn>
+                                        <p:tgtEl>
+                                          <p:spTgt spid="9">
+                                            <p:txEl>
+                                              <p:pRg st="1" end="1"/>
+                                            </p:txEl>
+                                          </p:spTgt>
+                                        </p:tgtEl>
+                                        <p:attrNameLst>
+                                          <p:attrName>style.visibility</p:attrName>
+                                        </p:attrNameLst>
+                                      </p:cBhvr>
+                                      <p:to>
+                                        <p:strVal val="visible"/>
+                                      </p:to>
+                                    </p:set>
+                                    <p:animEffect transition="in" filter="fade">
+                                      <p:cBhvr>
+                                        <p:cTn id="17" dur="500"/>
+                                        <p:tgtEl>
+                                          <p:spTgt spid="9">
+                                            <p:txEl>
+                                              <p:pRg st="1" end="1"/>
+                                            </p:txEl>
+                                          </p:spTgt>
+                                        </p:tgtEl>
+                                      </p:cBhvr>
+                                    </p:animEffect>
+                                  </p:childTnLst>
+                                </p:cTn>
+                              </p:par>
+                            </p:childTnLst>
+                          </p:cTn>
+                        </p:par>
+                      </p:childTnLst>
+                    </p:cTn>
+                  </p:par>
+                </p:childTnLst>
+              </p:cTn>
+              <p:prevCondLst>
+                <p:cond evt="onPrev" delay="0">
+                  <p:tgtEl>
+                    <p:sldTgt/>
+                  </p:tgtEl>
+                </p:cond>
+              </p:prevCondLst>
+              <p:nextCondLst>
+                <p:cond evt="onNext" delay="0">
+                  <p:tgtEl>
+                    <p:sldTgt/>
+                  </p:tgtEl>
+                </p:cond>
+              </p:nextCondLst>
+            </p:seq>
+          </p:childTnLst>
+        </p:cTn>
+      </p:par>
+    </p:tnLst>
+    <p:bldLst>
+      <p:bldP spid="5" grpId="0" build="p"/>
+      <p:bldP spid="9" grpId="0" build="p"/>
+    </p:bldLst>
+  </p:timing>
 </p:sld>
 </file>
 
@@ -27498,6 +29790,284 @@
   <p:clrMapOvr>
     <a:masterClrMapping/>
   </p:clrMapOvr>
+  <p:timing>
+    <p:tnLst>
+      <p:par>
+        <p:cTn id="1" dur="indefinite" restart="never" nodeType="tmRoot">
+          <p:childTnLst>
+            <p:seq concurrent="1" nextAc="seek">
+              <p:cTn id="2" dur="indefinite" nodeType="mainSeq">
+                <p:childTnLst>
+                  <p:par>
+                    <p:cTn id="3" fill="hold">
+                      <p:stCondLst>
+                        <p:cond delay="indefinite"/>
+                      </p:stCondLst>
+                      <p:childTnLst>
+                        <p:par>
+                          <p:cTn id="4" fill="hold">
+                            <p:stCondLst>
+                              <p:cond delay="0"/>
+                            </p:stCondLst>
+                            <p:childTnLst>
+                              <p:par>
+                                <p:cTn id="5" presetID="10" presetClass="entr" presetSubtype="0" fill="hold" grpId="0" nodeType="clickEffect">
+                                  <p:stCondLst>
+                                    <p:cond delay="0"/>
+                                  </p:stCondLst>
+                                  <p:childTnLst>
+                                    <p:set>
+                                      <p:cBhvr>
+                                        <p:cTn id="6" dur="1" fill="hold">
+                                          <p:stCondLst>
+                                            <p:cond delay="0"/>
+                                          </p:stCondLst>
+                                        </p:cTn>
+                                        <p:tgtEl>
+                                          <p:spTgt spid="5">
+                                            <p:txEl>
+                                              <p:pRg st="0" end="0"/>
+                                            </p:txEl>
+                                          </p:spTgt>
+                                        </p:tgtEl>
+                                        <p:attrNameLst>
+                                          <p:attrName>style.visibility</p:attrName>
+                                        </p:attrNameLst>
+                                      </p:cBhvr>
+                                      <p:to>
+                                        <p:strVal val="visible"/>
+                                      </p:to>
+                                    </p:set>
+                                    <p:animEffect transition="in" filter="fade">
+                                      <p:cBhvr>
+                                        <p:cTn id="7" dur="500"/>
+                                        <p:tgtEl>
+                                          <p:spTgt spid="5">
+                                            <p:txEl>
+                                              <p:pRg st="0" end="0"/>
+                                            </p:txEl>
+                                          </p:spTgt>
+                                        </p:tgtEl>
+                                      </p:cBhvr>
+                                    </p:animEffect>
+                                  </p:childTnLst>
+                                </p:cTn>
+                              </p:par>
+                            </p:childTnLst>
+                          </p:cTn>
+                        </p:par>
+                      </p:childTnLst>
+                    </p:cTn>
+                  </p:par>
+                  <p:par>
+                    <p:cTn id="8" fill="hold">
+                      <p:stCondLst>
+                        <p:cond delay="indefinite"/>
+                      </p:stCondLst>
+                      <p:childTnLst>
+                        <p:par>
+                          <p:cTn id="9" fill="hold">
+                            <p:stCondLst>
+                              <p:cond delay="0"/>
+                            </p:stCondLst>
+                            <p:childTnLst>
+                              <p:par>
+                                <p:cTn id="10" presetID="10" presetClass="entr" presetSubtype="0" fill="hold" grpId="0" nodeType="clickEffect">
+                                  <p:stCondLst>
+                                    <p:cond delay="0"/>
+                                  </p:stCondLst>
+                                  <p:childTnLst>
+                                    <p:set>
+                                      <p:cBhvr>
+                                        <p:cTn id="11" dur="1" fill="hold">
+                                          <p:stCondLst>
+                                            <p:cond delay="0"/>
+                                          </p:stCondLst>
+                                        </p:cTn>
+                                        <p:tgtEl>
+                                          <p:spTgt spid="5">
+                                            <p:txEl>
+                                              <p:pRg st="1" end="1"/>
+                                            </p:txEl>
+                                          </p:spTgt>
+                                        </p:tgtEl>
+                                        <p:attrNameLst>
+                                          <p:attrName>style.visibility</p:attrName>
+                                        </p:attrNameLst>
+                                      </p:cBhvr>
+                                      <p:to>
+                                        <p:strVal val="visible"/>
+                                      </p:to>
+                                    </p:set>
+                                    <p:animEffect transition="in" filter="fade">
+                                      <p:cBhvr>
+                                        <p:cTn id="12" dur="500"/>
+                                        <p:tgtEl>
+                                          <p:spTgt spid="5">
+                                            <p:txEl>
+                                              <p:pRg st="1" end="1"/>
+                                            </p:txEl>
+                                          </p:spTgt>
+                                        </p:tgtEl>
+                                      </p:cBhvr>
+                                    </p:animEffect>
+                                  </p:childTnLst>
+                                </p:cTn>
+                              </p:par>
+                            </p:childTnLst>
+                          </p:cTn>
+                        </p:par>
+                      </p:childTnLst>
+                    </p:cTn>
+                  </p:par>
+                  <p:par>
+                    <p:cTn id="13" fill="hold">
+                      <p:stCondLst>
+                        <p:cond delay="indefinite"/>
+                      </p:stCondLst>
+                      <p:childTnLst>
+                        <p:par>
+                          <p:cTn id="14" fill="hold">
+                            <p:stCondLst>
+                              <p:cond delay="0"/>
+                            </p:stCondLst>
+                            <p:childTnLst>
+                              <p:par>
+                                <p:cTn id="15" presetID="10" presetClass="entr" presetSubtype="0" fill="hold" grpId="0" nodeType="clickEffect">
+                                  <p:stCondLst>
+                                    <p:cond delay="0"/>
+                                  </p:stCondLst>
+                                  <p:childTnLst>
+                                    <p:set>
+                                      <p:cBhvr>
+                                        <p:cTn id="16" dur="1" fill="hold">
+                                          <p:stCondLst>
+                                            <p:cond delay="0"/>
+                                          </p:stCondLst>
+                                        </p:cTn>
+                                        <p:tgtEl>
+                                          <p:spTgt spid="9">
+                                            <p:txEl>
+                                              <p:pRg st="0" end="0"/>
+                                            </p:txEl>
+                                          </p:spTgt>
+                                        </p:tgtEl>
+                                        <p:attrNameLst>
+                                          <p:attrName>style.visibility</p:attrName>
+                                        </p:attrNameLst>
+                                      </p:cBhvr>
+                                      <p:to>
+                                        <p:strVal val="visible"/>
+                                      </p:to>
+                                    </p:set>
+                                    <p:animEffect transition="in" filter="fade">
+                                      <p:cBhvr>
+                                        <p:cTn id="17" dur="500"/>
+                                        <p:tgtEl>
+                                          <p:spTgt spid="9">
+                                            <p:txEl>
+                                              <p:pRg st="0" end="0"/>
+                                            </p:txEl>
+                                          </p:spTgt>
+                                        </p:tgtEl>
+                                      </p:cBhvr>
+                                    </p:animEffect>
+                                  </p:childTnLst>
+                                </p:cTn>
+                              </p:par>
+                            </p:childTnLst>
+                          </p:cTn>
+                        </p:par>
+                      </p:childTnLst>
+                    </p:cTn>
+                  </p:par>
+                  <p:par>
+                    <p:cTn id="18" fill="hold">
+                      <p:stCondLst>
+                        <p:cond delay="indefinite"/>
+                      </p:stCondLst>
+                      <p:childTnLst>
+                        <p:par>
+                          <p:cTn id="19" fill="hold">
+                            <p:stCondLst>
+                              <p:cond delay="0"/>
+                            </p:stCondLst>
+                            <p:childTnLst>
+                              <p:par>
+                                <p:cTn id="20" presetID="10" presetClass="entr" presetSubtype="0" fill="hold" grpId="0" nodeType="clickEffect">
+                                  <p:stCondLst>
+                                    <p:cond delay="0"/>
+                                  </p:stCondLst>
+                                  <p:childTnLst>
+                                    <p:set>
+                                      <p:cBhvr>
+                                        <p:cTn id="21" dur="1" fill="hold">
+                                          <p:stCondLst>
+                                            <p:cond delay="0"/>
+                                          </p:stCondLst>
+                                        </p:cTn>
+                                        <p:tgtEl>
+                                          <p:spTgt spid="9">
+                                            <p:txEl>
+                                              <p:pRg st="1" end="1"/>
+                                            </p:txEl>
+                                          </p:spTgt>
+                                        </p:tgtEl>
+                                        <p:attrNameLst>
+                                          <p:attrName>style.visibility</p:attrName>
+                                        </p:attrNameLst>
+                                      </p:cBhvr>
+                                      <p:to>
+                                        <p:strVal val="visible"/>
+                                      </p:to>
+                                    </p:set>
+                                    <p:animEffect transition="in" filter="fade">
+                                      <p:cBhvr>
+                                        <p:cTn id="22" dur="500"/>
+                                        <p:tgtEl>
+                                          <p:spTgt spid="9">
+                                            <p:txEl>
+                                              <p:pRg st="1" end="1"/>
+                                            </p:txEl>
+                                          </p:spTgt>
+                                        </p:tgtEl>
+                                      </p:cBhvr>
+                                    </p:animEffect>
+                                  </p:childTnLst>
+                                </p:cTn>
+                              </p:par>
+                            </p:childTnLst>
+                          </p:cTn>
+                        </p:par>
+                      </p:childTnLst>
+                    </p:cTn>
+                  </p:par>
+                </p:childTnLst>
+              </p:cTn>
+              <p:prevCondLst>
+                <p:cond evt="onPrev" delay="0">
+                  <p:tgtEl>
+                    <p:sldTgt/>
+                  </p:tgtEl>
+                </p:cond>
+              </p:prevCondLst>
+              <p:nextCondLst>
+                <p:cond evt="onNext" delay="0">
+                  <p:tgtEl>
+                    <p:sldTgt/>
+                  </p:tgtEl>
+                </p:cond>
+              </p:nextCondLst>
+            </p:seq>
+          </p:childTnLst>
+        </p:cTn>
+      </p:par>
+    </p:tnLst>
+    <p:bldLst>
+      <p:bldP spid="5" grpId="0" build="p"/>
+      <p:bldP spid="9" grpId="0" build="p"/>
+    </p:bldLst>
+  </p:timing>
 </p:sld>
 </file>
 
@@ -27674,6 +30244,223 @@
   <p:clrMapOvr>
     <a:masterClrMapping/>
   </p:clrMapOvr>
+  <p:timing>
+    <p:tnLst>
+      <p:par>
+        <p:cTn id="1" dur="indefinite" restart="never" nodeType="tmRoot">
+          <p:childTnLst>
+            <p:seq concurrent="1" nextAc="seek">
+              <p:cTn id="2" dur="indefinite" nodeType="mainSeq">
+                <p:childTnLst>
+                  <p:par>
+                    <p:cTn id="3" fill="hold">
+                      <p:stCondLst>
+                        <p:cond delay="indefinite"/>
+                      </p:stCondLst>
+                      <p:childTnLst>
+                        <p:par>
+                          <p:cTn id="4" fill="hold">
+                            <p:stCondLst>
+                              <p:cond delay="0"/>
+                            </p:stCondLst>
+                            <p:childTnLst>
+                              <p:par>
+                                <p:cTn id="5" presetID="10" presetClass="entr" presetSubtype="0" fill="hold" grpId="0" nodeType="clickEffect">
+                                  <p:stCondLst>
+                                    <p:cond delay="0"/>
+                                  </p:stCondLst>
+                                  <p:childTnLst>
+                                    <p:set>
+                                      <p:cBhvr>
+                                        <p:cTn id="6" dur="1" fill="hold">
+                                          <p:stCondLst>
+                                            <p:cond delay="0"/>
+                                          </p:stCondLst>
+                                        </p:cTn>
+                                        <p:tgtEl>
+                                          <p:spTgt spid="5">
+                                            <p:txEl>
+                                              <p:pRg st="0" end="0"/>
+                                            </p:txEl>
+                                          </p:spTgt>
+                                        </p:tgtEl>
+                                        <p:attrNameLst>
+                                          <p:attrName>style.visibility</p:attrName>
+                                        </p:attrNameLst>
+                                      </p:cBhvr>
+                                      <p:to>
+                                        <p:strVal val="visible"/>
+                                      </p:to>
+                                    </p:set>
+                                    <p:animEffect transition="in" filter="fade">
+                                      <p:cBhvr>
+                                        <p:cTn id="7" dur="500"/>
+                                        <p:tgtEl>
+                                          <p:spTgt spid="5">
+                                            <p:txEl>
+                                              <p:pRg st="0" end="0"/>
+                                            </p:txEl>
+                                          </p:spTgt>
+                                        </p:tgtEl>
+                                      </p:cBhvr>
+                                    </p:animEffect>
+                                  </p:childTnLst>
+                                </p:cTn>
+                              </p:par>
+                            </p:childTnLst>
+                          </p:cTn>
+                        </p:par>
+                      </p:childTnLst>
+                    </p:cTn>
+                  </p:par>
+                  <p:par>
+                    <p:cTn id="8" fill="hold">
+                      <p:stCondLst>
+                        <p:cond delay="indefinite"/>
+                      </p:stCondLst>
+                      <p:childTnLst>
+                        <p:par>
+                          <p:cTn id="9" fill="hold">
+                            <p:stCondLst>
+                              <p:cond delay="0"/>
+                            </p:stCondLst>
+                            <p:childTnLst>
+                              <p:par>
+                                <p:cTn id="10" presetID="10" presetClass="entr" presetSubtype="0" fill="hold" grpId="0" nodeType="clickEffect">
+                                  <p:stCondLst>
+                                    <p:cond delay="0"/>
+                                  </p:stCondLst>
+                                  <p:childTnLst>
+                                    <p:set>
+                                      <p:cBhvr>
+                                        <p:cTn id="11" dur="1" fill="hold">
+                                          <p:stCondLst>
+                                            <p:cond delay="0"/>
+                                          </p:stCondLst>
+                                        </p:cTn>
+                                        <p:tgtEl>
+                                          <p:spTgt spid="9">
+                                            <p:txEl>
+                                              <p:pRg st="0" end="0"/>
+                                            </p:txEl>
+                                          </p:spTgt>
+                                        </p:tgtEl>
+                                        <p:attrNameLst>
+                                          <p:attrName>style.visibility</p:attrName>
+                                        </p:attrNameLst>
+                                      </p:cBhvr>
+                                      <p:to>
+                                        <p:strVal val="visible"/>
+                                      </p:to>
+                                    </p:set>
+                                    <p:animEffect transition="in" filter="fade">
+                                      <p:cBhvr>
+                                        <p:cTn id="12" dur="500"/>
+                                        <p:tgtEl>
+                                          <p:spTgt spid="9">
+                                            <p:txEl>
+                                              <p:pRg st="0" end="0"/>
+                                            </p:txEl>
+                                          </p:spTgt>
+                                        </p:tgtEl>
+                                      </p:cBhvr>
+                                    </p:animEffect>
+                                  </p:childTnLst>
+                                </p:cTn>
+                              </p:par>
+                            </p:childTnLst>
+                          </p:cTn>
+                        </p:par>
+                      </p:childTnLst>
+                    </p:cTn>
+                  </p:par>
+                  <p:par>
+                    <p:cTn id="13" fill="hold">
+                      <p:stCondLst>
+                        <p:cond delay="indefinite"/>
+                      </p:stCondLst>
+                      <p:childTnLst>
+                        <p:par>
+                          <p:cTn id="14" fill="hold">
+                            <p:stCondLst>
+                              <p:cond delay="0"/>
+                            </p:stCondLst>
+                            <p:childTnLst>
+                              <p:par>
+                                <p:cTn id="15" presetID="10" presetClass="entr" presetSubtype="0" fill="hold" grpId="0" nodeType="clickEffect">
+                                  <p:stCondLst>
+                                    <p:cond delay="0"/>
+                                  </p:stCondLst>
+                                  <p:childTnLst>
+                                    <p:set>
+                                      <p:cBhvr>
+                                        <p:cTn id="16" dur="1" fill="hold">
+                                          <p:stCondLst>
+                                            <p:cond delay="0"/>
+                                          </p:stCondLst>
+                                        </p:cTn>
+                                        <p:tgtEl>
+                                          <p:spTgt spid="9">
+                                            <p:txEl>
+                                              <p:pRg st="1" end="1"/>
+                                            </p:txEl>
+                                          </p:spTgt>
+                                        </p:tgtEl>
+                                        <p:attrNameLst>
+                                          <p:attrName>style.visibility</p:attrName>
+                                        </p:attrNameLst>
+                                      </p:cBhvr>
+                                      <p:to>
+                                        <p:strVal val="visible"/>
+                                      </p:to>
+                                    </p:set>
+                                    <p:animEffect transition="in" filter="fade">
+                                      <p:cBhvr>
+                                        <p:cTn id="17" dur="500"/>
+                                        <p:tgtEl>
+                                          <p:spTgt spid="9">
+                                            <p:txEl>
+                                              <p:pRg st="1" end="1"/>
+                                            </p:txEl>
+                                          </p:spTgt>
+                                        </p:tgtEl>
+                                      </p:cBhvr>
+                                    </p:animEffect>
+                                  </p:childTnLst>
+                                </p:cTn>
+                              </p:par>
+                            </p:childTnLst>
+                          </p:cTn>
+                        </p:par>
+                      </p:childTnLst>
+                    </p:cTn>
+                  </p:par>
+                </p:childTnLst>
+              </p:cTn>
+              <p:prevCondLst>
+                <p:cond evt="onPrev" delay="0">
+                  <p:tgtEl>
+                    <p:sldTgt/>
+                  </p:tgtEl>
+                </p:cond>
+              </p:prevCondLst>
+              <p:nextCondLst>
+                <p:cond evt="onNext" delay="0">
+                  <p:tgtEl>
+                    <p:sldTgt/>
+                  </p:tgtEl>
+                </p:cond>
+              </p:nextCondLst>
+            </p:seq>
+          </p:childTnLst>
+        </p:cTn>
+      </p:par>
+    </p:tnLst>
+    <p:bldLst>
+      <p:bldP spid="5" grpId="0" build="p"/>
+      <p:bldP spid="9" grpId="0" build="p"/>
+    </p:bldLst>
+  </p:timing>
 </p:sld>
 </file>
 
@@ -27844,6 +30631,162 @@
   <p:clrMapOvr>
     <a:masterClrMapping/>
   </p:clrMapOvr>
+  <p:timing>
+    <p:tnLst>
+      <p:par>
+        <p:cTn id="1" dur="indefinite" restart="never" nodeType="tmRoot">
+          <p:childTnLst>
+            <p:seq concurrent="1" nextAc="seek">
+              <p:cTn id="2" dur="indefinite" nodeType="mainSeq">
+                <p:childTnLst>
+                  <p:par>
+                    <p:cTn id="3" fill="hold">
+                      <p:stCondLst>
+                        <p:cond delay="indefinite"/>
+                      </p:stCondLst>
+                      <p:childTnLst>
+                        <p:par>
+                          <p:cTn id="4" fill="hold">
+                            <p:stCondLst>
+                              <p:cond delay="0"/>
+                            </p:stCondLst>
+                            <p:childTnLst>
+                              <p:par>
+                                <p:cTn id="5" presetID="10" presetClass="entr" presetSubtype="0" fill="hold" grpId="0" nodeType="clickEffect">
+                                  <p:stCondLst>
+                                    <p:cond delay="0"/>
+                                  </p:stCondLst>
+                                  <p:childTnLst>
+                                    <p:set>
+                                      <p:cBhvr>
+                                        <p:cTn id="6" dur="1" fill="hold">
+                                          <p:stCondLst>
+                                            <p:cond delay="0"/>
+                                          </p:stCondLst>
+                                        </p:cTn>
+                                        <p:tgtEl>
+                                          <p:spTgt spid="5">
+                                            <p:txEl>
+                                              <p:pRg st="0" end="0"/>
+                                            </p:txEl>
+                                          </p:spTgt>
+                                        </p:tgtEl>
+                                        <p:attrNameLst>
+                                          <p:attrName>style.visibility</p:attrName>
+                                        </p:attrNameLst>
+                                      </p:cBhvr>
+                                      <p:to>
+                                        <p:strVal val="visible"/>
+                                      </p:to>
+                                    </p:set>
+                                    <p:animEffect transition="in" filter="fade">
+                                      <p:cBhvr>
+                                        <p:cTn id="7" dur="500"/>
+                                        <p:tgtEl>
+                                          <p:spTgt spid="5">
+                                            <p:txEl>
+                                              <p:pRg st="0" end="0"/>
+                                            </p:txEl>
+                                          </p:spTgt>
+                                        </p:tgtEl>
+                                      </p:cBhvr>
+                                    </p:animEffect>
+                                  </p:childTnLst>
+                                </p:cTn>
+                              </p:par>
+                            </p:childTnLst>
+                          </p:cTn>
+                        </p:par>
+                      </p:childTnLst>
+                    </p:cTn>
+                  </p:par>
+                  <p:par>
+                    <p:cTn id="8" fill="hold">
+                      <p:stCondLst>
+                        <p:cond delay="indefinite"/>
+                      </p:stCondLst>
+                      <p:childTnLst>
+                        <p:par>
+                          <p:cTn id="9" fill="hold">
+                            <p:stCondLst>
+                              <p:cond delay="0"/>
+                            </p:stCondLst>
+                            <p:childTnLst>
+                              <p:par>
+                                <p:cTn id="10" presetID="10" presetClass="entr" presetSubtype="0" fill="hold" grpId="0" nodeType="clickEffect">
+                                  <p:stCondLst>
+                                    <p:cond delay="0"/>
+                                  </p:stCondLst>
+                                  <p:childTnLst>
+                                    <p:set>
+                                      <p:cBhvr>
+                                        <p:cTn id="11" dur="1" fill="hold">
+                                          <p:stCondLst>
+                                            <p:cond delay="0"/>
+                                          </p:stCondLst>
+                                        </p:cTn>
+                                        <p:tgtEl>
+                                          <p:spTgt spid="9">
+                                            <p:txEl>
+                                              <p:pRg st="0" end="0"/>
+                                            </p:txEl>
+                                          </p:spTgt>
+                                        </p:tgtEl>
+                                        <p:attrNameLst>
+                                          <p:attrName>style.visibility</p:attrName>
+                                        </p:attrNameLst>
+                                      </p:cBhvr>
+                                      <p:to>
+                                        <p:strVal val="visible"/>
+                                      </p:to>
+                                    </p:set>
+                                    <p:animEffect transition="in" filter="fade">
+                                      <p:cBhvr>
+                                        <p:cTn id="12" dur="500"/>
+                                        <p:tgtEl>
+                                          <p:spTgt spid="9">
+                                            <p:txEl>
+                                              <p:pRg st="0" end="0"/>
+                                            </p:txEl>
+                                          </p:spTgt>
+                                        </p:tgtEl>
+                                      </p:cBhvr>
+                                    </p:animEffect>
+                                  </p:childTnLst>
+                                </p:cTn>
+                              </p:par>
+                            </p:childTnLst>
+                          </p:cTn>
+                        </p:par>
+                      </p:childTnLst>
+                    </p:cTn>
+                  </p:par>
+                </p:childTnLst>
+              </p:cTn>
+              <p:prevCondLst>
+                <p:cond evt="onPrev" delay="0">
+                  <p:tgtEl>
+                    <p:sldTgt/>
+                  </p:tgtEl>
+                </p:cond>
+              </p:prevCondLst>
+              <p:nextCondLst>
+                <p:cond evt="onNext" delay="0">
+                  <p:tgtEl>
+                    <p:sldTgt/>
+                  </p:tgtEl>
+                </p:cond>
+              </p:nextCondLst>
+            </p:seq>
+          </p:childTnLst>
+        </p:cTn>
+      </p:par>
+    </p:tnLst>
+    <p:bldLst>
+      <p:bldP spid="5" grpId="0" build="p"/>
+      <p:bldP spid="9" grpId="0" build="p"/>
+    </p:bldLst>
+  </p:timing>
 </p:sld>
 </file>
 
@@ -28020,6 +30963,223 @@
   <p:clrMapOvr>
     <a:masterClrMapping/>
   </p:clrMapOvr>
+  <p:timing>
+    <p:tnLst>
+      <p:par>
+        <p:cTn id="1" dur="indefinite" restart="never" nodeType="tmRoot">
+          <p:childTnLst>
+            <p:seq concurrent="1" nextAc="seek">
+              <p:cTn id="2" dur="indefinite" nodeType="mainSeq">
+                <p:childTnLst>
+                  <p:par>
+                    <p:cTn id="3" fill="hold">
+                      <p:stCondLst>
+                        <p:cond delay="indefinite"/>
+                      </p:stCondLst>
+                      <p:childTnLst>
+                        <p:par>
+                          <p:cTn id="4" fill="hold">
+                            <p:stCondLst>
+                              <p:cond delay="0"/>
+                            </p:stCondLst>
+                            <p:childTnLst>
+                              <p:par>
+                                <p:cTn id="5" presetID="10" presetClass="entr" presetSubtype="0" fill="hold" grpId="0" nodeType="clickEffect">
+                                  <p:stCondLst>
+                                    <p:cond delay="0"/>
+                                  </p:stCondLst>
+                                  <p:childTnLst>
+                                    <p:set>
+                                      <p:cBhvr>
+                                        <p:cTn id="6" dur="1" fill="hold">
+                                          <p:stCondLst>
+                                            <p:cond delay="0"/>
+                                          </p:stCondLst>
+                                        </p:cTn>
+                                        <p:tgtEl>
+                                          <p:spTgt spid="5">
+                                            <p:txEl>
+                                              <p:pRg st="0" end="0"/>
+                                            </p:txEl>
+                                          </p:spTgt>
+                                        </p:tgtEl>
+                                        <p:attrNameLst>
+                                          <p:attrName>style.visibility</p:attrName>
+                                        </p:attrNameLst>
+                                      </p:cBhvr>
+                                      <p:to>
+                                        <p:strVal val="visible"/>
+                                      </p:to>
+                                    </p:set>
+                                    <p:animEffect transition="in" filter="fade">
+                                      <p:cBhvr>
+                                        <p:cTn id="7" dur="500"/>
+                                        <p:tgtEl>
+                                          <p:spTgt spid="5">
+                                            <p:txEl>
+                                              <p:pRg st="0" end="0"/>
+                                            </p:txEl>
+                                          </p:spTgt>
+                                        </p:tgtEl>
+                                      </p:cBhvr>
+                                    </p:animEffect>
+                                  </p:childTnLst>
+                                </p:cTn>
+                              </p:par>
+                            </p:childTnLst>
+                          </p:cTn>
+                        </p:par>
+                      </p:childTnLst>
+                    </p:cTn>
+                  </p:par>
+                  <p:par>
+                    <p:cTn id="8" fill="hold">
+                      <p:stCondLst>
+                        <p:cond delay="indefinite"/>
+                      </p:stCondLst>
+                      <p:childTnLst>
+                        <p:par>
+                          <p:cTn id="9" fill="hold">
+                            <p:stCondLst>
+                              <p:cond delay="0"/>
+                            </p:stCondLst>
+                            <p:childTnLst>
+                              <p:par>
+                                <p:cTn id="10" presetID="10" presetClass="entr" presetSubtype="0" fill="hold" grpId="0" nodeType="clickEffect">
+                                  <p:stCondLst>
+                                    <p:cond delay="0"/>
+                                  </p:stCondLst>
+                                  <p:childTnLst>
+                                    <p:set>
+                                      <p:cBhvr>
+                                        <p:cTn id="11" dur="1" fill="hold">
+                                          <p:stCondLst>
+                                            <p:cond delay="0"/>
+                                          </p:stCondLst>
+                                        </p:cTn>
+                                        <p:tgtEl>
+                                          <p:spTgt spid="5">
+                                            <p:txEl>
+                                              <p:pRg st="1" end="1"/>
+                                            </p:txEl>
+                                          </p:spTgt>
+                                        </p:tgtEl>
+                                        <p:attrNameLst>
+                                          <p:attrName>style.visibility</p:attrName>
+                                        </p:attrNameLst>
+                                      </p:cBhvr>
+                                      <p:to>
+                                        <p:strVal val="visible"/>
+                                      </p:to>
+                                    </p:set>
+                                    <p:animEffect transition="in" filter="fade">
+                                      <p:cBhvr>
+                                        <p:cTn id="12" dur="500"/>
+                                        <p:tgtEl>
+                                          <p:spTgt spid="5">
+                                            <p:txEl>
+                                              <p:pRg st="1" end="1"/>
+                                            </p:txEl>
+                                          </p:spTgt>
+                                        </p:tgtEl>
+                                      </p:cBhvr>
+                                    </p:animEffect>
+                                  </p:childTnLst>
+                                </p:cTn>
+                              </p:par>
+                            </p:childTnLst>
+                          </p:cTn>
+                        </p:par>
+                      </p:childTnLst>
+                    </p:cTn>
+                  </p:par>
+                  <p:par>
+                    <p:cTn id="13" fill="hold">
+                      <p:stCondLst>
+                        <p:cond delay="indefinite"/>
+                      </p:stCondLst>
+                      <p:childTnLst>
+                        <p:par>
+                          <p:cTn id="14" fill="hold">
+                            <p:stCondLst>
+                              <p:cond delay="0"/>
+                            </p:stCondLst>
+                            <p:childTnLst>
+                              <p:par>
+                                <p:cTn id="15" presetID="10" presetClass="entr" presetSubtype="0" fill="hold" grpId="0" nodeType="clickEffect">
+                                  <p:stCondLst>
+                                    <p:cond delay="0"/>
+                                  </p:stCondLst>
+                                  <p:childTnLst>
+                                    <p:set>
+                                      <p:cBhvr>
+                                        <p:cTn id="16" dur="1" fill="hold">
+                                          <p:stCondLst>
+                                            <p:cond delay="0"/>
+                                          </p:stCondLst>
+                                        </p:cTn>
+                                        <p:tgtEl>
+                                          <p:spTgt spid="9">
+                                            <p:txEl>
+                                              <p:pRg st="0" end="0"/>
+                                            </p:txEl>
+                                          </p:spTgt>
+                                        </p:tgtEl>
+                                        <p:attrNameLst>
+                                          <p:attrName>style.visibility</p:attrName>
+                                        </p:attrNameLst>
+                                      </p:cBhvr>
+                                      <p:to>
+                                        <p:strVal val="visible"/>
+                                      </p:to>
+                                    </p:set>
+                                    <p:animEffect transition="in" filter="fade">
+                                      <p:cBhvr>
+                                        <p:cTn id="17" dur="500"/>
+                                        <p:tgtEl>
+                                          <p:spTgt spid="9">
+                                            <p:txEl>
+                                              <p:pRg st="0" end="0"/>
+                                            </p:txEl>
+                                          </p:spTgt>
+                                        </p:tgtEl>
+                                      </p:cBhvr>
+                                    </p:animEffect>
+                                  </p:childTnLst>
+                                </p:cTn>
+                              </p:par>
+                            </p:childTnLst>
+                          </p:cTn>
+                        </p:par>
+                      </p:childTnLst>
+                    </p:cTn>
+                  </p:par>
+                </p:childTnLst>
+              </p:cTn>
+              <p:prevCondLst>
+                <p:cond evt="onPrev" delay="0">
+                  <p:tgtEl>
+                    <p:sldTgt/>
+                  </p:tgtEl>
+                </p:cond>
+              </p:prevCondLst>
+              <p:nextCondLst>
+                <p:cond evt="onNext" delay="0">
+                  <p:tgtEl>
+                    <p:sldTgt/>
+                  </p:tgtEl>
+                </p:cond>
+              </p:nextCondLst>
+            </p:seq>
+          </p:childTnLst>
+        </p:cTn>
+      </p:par>
+    </p:tnLst>
+    <p:bldLst>
+      <p:bldP spid="5" grpId="0" build="p"/>
+      <p:bldP spid="9" grpId="0" build="p"/>
+    </p:bldLst>
+  </p:timing>
 </p:sld>
 </file>
 
@@ -28212,6 +31372,222 @@
   <p:clrMapOvr>
     <a:masterClrMapping/>
   </p:clrMapOvr>
+  <p:timing>
+    <p:tnLst>
+      <p:par>
+        <p:cTn id="1" dur="indefinite" restart="never" nodeType="tmRoot">
+          <p:childTnLst>
+            <p:seq concurrent="1" nextAc="seek">
+              <p:cTn id="2" dur="indefinite" nodeType="mainSeq">
+                <p:childTnLst>
+                  <p:par>
+                    <p:cTn id="3" fill="hold">
+                      <p:stCondLst>
+                        <p:cond delay="indefinite"/>
+                      </p:stCondLst>
+                      <p:childTnLst>
+                        <p:par>
+                          <p:cTn id="4" fill="hold">
+                            <p:stCondLst>
+                              <p:cond delay="0"/>
+                            </p:stCondLst>
+                            <p:childTnLst>
+                              <p:par>
+                                <p:cTn id="5" presetID="10" presetClass="entr" presetSubtype="0" fill="hold" grpId="0" nodeType="clickEffect">
+                                  <p:stCondLst>
+                                    <p:cond delay="0"/>
+                                  </p:stCondLst>
+                                  <p:childTnLst>
+                                    <p:set>
+                                      <p:cBhvr>
+                                        <p:cTn id="6" dur="1" fill="hold">
+                                          <p:stCondLst>
+                                            <p:cond delay="0"/>
+                                          </p:stCondLst>
+                                        </p:cTn>
+                                        <p:tgtEl>
+                                          <p:spTgt spid="5">
+                                            <p:txEl>
+                                              <p:pRg st="0" end="0"/>
+                                            </p:txEl>
+                                          </p:spTgt>
+                                        </p:tgtEl>
+                                        <p:attrNameLst>
+                                          <p:attrName>style.visibility</p:attrName>
+                                        </p:attrNameLst>
+                                      </p:cBhvr>
+                                      <p:to>
+                                        <p:strVal val="visible"/>
+                                      </p:to>
+                                    </p:set>
+                                    <p:animEffect transition="in" filter="fade">
+                                      <p:cBhvr>
+                                        <p:cTn id="7" dur="500"/>
+                                        <p:tgtEl>
+                                          <p:spTgt spid="5">
+                                            <p:txEl>
+                                              <p:pRg st="0" end="0"/>
+                                            </p:txEl>
+                                          </p:spTgt>
+                                        </p:tgtEl>
+                                      </p:cBhvr>
+                                    </p:animEffect>
+                                  </p:childTnLst>
+                                </p:cTn>
+                              </p:par>
+                            </p:childTnLst>
+                          </p:cTn>
+                        </p:par>
+                      </p:childTnLst>
+                    </p:cTn>
+                  </p:par>
+                  <p:par>
+                    <p:cTn id="8" fill="hold">
+                      <p:stCondLst>
+                        <p:cond delay="indefinite"/>
+                      </p:stCondLst>
+                      <p:childTnLst>
+                        <p:par>
+                          <p:cTn id="9" fill="hold">
+                            <p:stCondLst>
+                              <p:cond delay="0"/>
+                            </p:stCondLst>
+                            <p:childTnLst>
+                              <p:par>
+                                <p:cTn id="10" presetID="10" presetClass="entr" presetSubtype="0" fill="hold" grpId="0" nodeType="clickEffect">
+                                  <p:stCondLst>
+                                    <p:cond delay="0"/>
+                                  </p:stCondLst>
+                                  <p:childTnLst>
+                                    <p:set>
+                                      <p:cBhvr>
+                                        <p:cTn id="11" dur="1" fill="hold">
+                                          <p:stCondLst>
+                                            <p:cond delay="0"/>
+                                          </p:stCondLst>
+                                        </p:cTn>
+                                        <p:tgtEl>
+                                          <p:spTgt spid="5">
+                                            <p:txEl>
+                                              <p:pRg st="1" end="1"/>
+                                            </p:txEl>
+                                          </p:spTgt>
+                                        </p:tgtEl>
+                                        <p:attrNameLst>
+                                          <p:attrName>style.visibility</p:attrName>
+                                        </p:attrNameLst>
+                                      </p:cBhvr>
+                                      <p:to>
+                                        <p:strVal val="visible"/>
+                                      </p:to>
+                                    </p:set>
+                                    <p:animEffect transition="in" filter="fade">
+                                      <p:cBhvr>
+                                        <p:cTn id="12" dur="500"/>
+                                        <p:tgtEl>
+                                          <p:spTgt spid="5">
+                                            <p:txEl>
+                                              <p:pRg st="1" end="1"/>
+                                            </p:txEl>
+                                          </p:spTgt>
+                                        </p:tgtEl>
+                                      </p:cBhvr>
+                                    </p:animEffect>
+                                  </p:childTnLst>
+                                </p:cTn>
+                              </p:par>
+                            </p:childTnLst>
+                          </p:cTn>
+                        </p:par>
+                      </p:childTnLst>
+                    </p:cTn>
+                  </p:par>
+                  <p:par>
+                    <p:cTn id="13" fill="hold">
+                      <p:stCondLst>
+                        <p:cond delay="indefinite"/>
+                      </p:stCondLst>
+                      <p:childTnLst>
+                        <p:par>
+                          <p:cTn id="14" fill="hold">
+                            <p:stCondLst>
+                              <p:cond delay="0"/>
+                            </p:stCondLst>
+                            <p:childTnLst>
+                              <p:par>
+                                <p:cTn id="15" presetID="10" presetClass="entr" presetSubtype="0" fill="hold" grpId="0" nodeType="clickEffect">
+                                  <p:stCondLst>
+                                    <p:cond delay="0"/>
+                                  </p:stCondLst>
+                                  <p:childTnLst>
+                                    <p:set>
+                                      <p:cBhvr>
+                                        <p:cTn id="16" dur="1" fill="hold">
+                                          <p:stCondLst>
+                                            <p:cond delay="0"/>
+                                          </p:stCondLst>
+                                        </p:cTn>
+                                        <p:tgtEl>
+                                          <p:spTgt spid="5">
+                                            <p:txEl>
+                                              <p:pRg st="2" end="2"/>
+                                            </p:txEl>
+                                          </p:spTgt>
+                                        </p:tgtEl>
+                                        <p:attrNameLst>
+                                          <p:attrName>style.visibility</p:attrName>
+                                        </p:attrNameLst>
+                                      </p:cBhvr>
+                                      <p:to>
+                                        <p:strVal val="visible"/>
+                                      </p:to>
+                                    </p:set>
+                                    <p:animEffect transition="in" filter="fade">
+                                      <p:cBhvr>
+                                        <p:cTn id="17" dur="500"/>
+                                        <p:tgtEl>
+                                          <p:spTgt spid="5">
+                                            <p:txEl>
+                                              <p:pRg st="2" end="2"/>
+                                            </p:txEl>
+                                          </p:spTgt>
+                                        </p:tgtEl>
+                                      </p:cBhvr>
+                                    </p:animEffect>
+                                  </p:childTnLst>
+                                </p:cTn>
+                              </p:par>
+                            </p:childTnLst>
+                          </p:cTn>
+                        </p:par>
+                      </p:childTnLst>
+                    </p:cTn>
+                  </p:par>
+                </p:childTnLst>
+              </p:cTn>
+              <p:prevCondLst>
+                <p:cond evt="onPrev" delay="0">
+                  <p:tgtEl>
+                    <p:sldTgt/>
+                  </p:tgtEl>
+                </p:cond>
+              </p:prevCondLst>
+              <p:nextCondLst>
+                <p:cond evt="onNext" delay="0">
+                  <p:tgtEl>
+                    <p:sldTgt/>
+                  </p:tgtEl>
+                </p:cond>
+              </p:nextCondLst>
+            </p:seq>
+          </p:childTnLst>
+        </p:cTn>
+      </p:par>
+    </p:tnLst>
+    <p:bldLst>
+      <p:bldP spid="5" grpId="0" build="p"/>
+    </p:bldLst>
+  </p:timing>
 </p:sld>
 </file>
 

</xml_diff>